<commit_message>
small update to slides
</commit_message>
<xml_diff>
--- a/books/deep-learning-design-patterns/Workshops/Junior/Deep Learning Design Patterns - Workshop - Chapter 3.pptx
+++ b/books/deep-learning-design-patterns/Workshops/Junior/Deep Learning Design Patterns - Workshop - Chapter 3.pptx
@@ -831,7 +831,7 @@
   <p:cSld>
     <p:spTree>
       <p:nvGrpSpPr>
-        <p:cNvPr id="126" name="Shape 126"/>
+        <p:cNvPr id="125" name="Shape 125"/>
         <p:cNvGrpSpPr/>
         <p:nvPr/>
       </p:nvGrpSpPr>
@@ -845,7 +845,7 @@
       </p:grpSpPr>
       <p:sp>
         <p:nvSpPr>
-          <p:cNvPr id="127" name="Google Shape;127;g6eab8a76fd_0_59:notes"/>
+          <p:cNvPr id="126" name="Google Shape;126;g6eab8a76fd_0_59:notes"/>
           <p:cNvSpPr/>
           <p:nvPr>
             <p:ph idx="2" type="sldImg"/>
@@ -880,7 +880,7 @@
       </p:sp>
       <p:sp>
         <p:nvSpPr>
-          <p:cNvPr id="128" name="Google Shape;128;g6eab8a76fd_0_59:notes"/>
+          <p:cNvPr id="127" name="Google Shape;127;g6eab8a76fd_0_59:notes"/>
           <p:cNvSpPr txBox="1"/>
           <p:nvPr>
             <p:ph idx="1" type="body"/>
@@ -930,7 +930,7 @@
   <p:cSld>
     <p:spTree>
       <p:nvGrpSpPr>
-        <p:cNvPr id="135" name="Shape 135"/>
+        <p:cNvPr id="134" name="Shape 134"/>
         <p:cNvGrpSpPr/>
         <p:nvPr/>
       </p:nvGrpSpPr>
@@ -944,7 +944,7 @@
       </p:grpSpPr>
       <p:sp>
         <p:nvSpPr>
-          <p:cNvPr id="136" name="Google Shape;136;g6eab8a76fd_0_69:notes"/>
+          <p:cNvPr id="135" name="Google Shape;135;g6eab8a76fd_0_69:notes"/>
           <p:cNvSpPr/>
           <p:nvPr>
             <p:ph idx="2" type="sldImg"/>
@@ -979,7 +979,7 @@
       </p:sp>
       <p:sp>
         <p:nvSpPr>
-          <p:cNvPr id="137" name="Google Shape;137;g6eab8a76fd_0_69:notes"/>
+          <p:cNvPr id="136" name="Google Shape;136;g6eab8a76fd_0_69:notes"/>
           <p:cNvSpPr txBox="1"/>
           <p:nvPr>
             <p:ph idx="1" type="body"/>
@@ -1029,7 +1029,7 @@
   <p:cSld>
     <p:spTree>
       <p:nvGrpSpPr>
-        <p:cNvPr id="142" name="Shape 142"/>
+        <p:cNvPr id="141" name="Shape 141"/>
         <p:cNvGrpSpPr/>
         <p:nvPr/>
       </p:nvGrpSpPr>
@@ -1043,7 +1043,7 @@
       </p:grpSpPr>
       <p:sp>
         <p:nvSpPr>
-          <p:cNvPr id="143" name="Google Shape;143;g6eab8a76fd_0_77:notes"/>
+          <p:cNvPr id="142" name="Google Shape;142;g6eab8a76fd_0_77:notes"/>
           <p:cNvSpPr/>
           <p:nvPr>
             <p:ph idx="2" type="sldImg"/>
@@ -1078,7 +1078,7 @@
       </p:sp>
       <p:sp>
         <p:nvSpPr>
-          <p:cNvPr id="144" name="Google Shape;144;g6eab8a76fd_0_77:notes"/>
+          <p:cNvPr id="143" name="Google Shape;143;g6eab8a76fd_0_77:notes"/>
           <p:cNvSpPr txBox="1"/>
           <p:nvPr>
             <p:ph idx="1" type="body"/>
@@ -1128,7 +1128,7 @@
   <p:cSld>
     <p:spTree>
       <p:nvGrpSpPr>
-        <p:cNvPr id="149" name="Shape 149"/>
+        <p:cNvPr id="148" name="Shape 148"/>
         <p:cNvGrpSpPr/>
         <p:nvPr/>
       </p:nvGrpSpPr>
@@ -1142,7 +1142,7 @@
       </p:grpSpPr>
       <p:sp>
         <p:nvSpPr>
-          <p:cNvPr id="150" name="Google Shape;150;g6eab8a76fd_0_85:notes"/>
+          <p:cNvPr id="149" name="Google Shape;149;g6eab8a76fd_0_85:notes"/>
           <p:cNvSpPr/>
           <p:nvPr>
             <p:ph idx="2" type="sldImg"/>
@@ -1177,7 +1177,7 @@
       </p:sp>
       <p:sp>
         <p:nvSpPr>
-          <p:cNvPr id="151" name="Google Shape;151;g6eab8a76fd_0_85:notes"/>
+          <p:cNvPr id="150" name="Google Shape;150;g6eab8a76fd_0_85:notes"/>
           <p:cNvSpPr txBox="1"/>
           <p:nvPr>
             <p:ph idx="1" type="body"/>
@@ -1227,7 +1227,7 @@
   <p:cSld>
     <p:spTree>
       <p:nvGrpSpPr>
-        <p:cNvPr id="158" name="Shape 158"/>
+        <p:cNvPr id="157" name="Shape 157"/>
         <p:cNvGrpSpPr/>
         <p:nvPr/>
       </p:nvGrpSpPr>
@@ -1241,7 +1241,7 @@
       </p:grpSpPr>
       <p:sp>
         <p:nvSpPr>
-          <p:cNvPr id="159" name="Google Shape;159;g6eab8a76fd_0_96:notes"/>
+          <p:cNvPr id="158" name="Google Shape;158;g6eab8a76fd_0_96:notes"/>
           <p:cNvSpPr/>
           <p:nvPr>
             <p:ph idx="2" type="sldImg"/>
@@ -1276,7 +1276,7 @@
       </p:sp>
       <p:sp>
         <p:nvSpPr>
-          <p:cNvPr id="160" name="Google Shape;160;g6eab8a76fd_0_96:notes"/>
+          <p:cNvPr id="159" name="Google Shape;159;g6eab8a76fd_0_96:notes"/>
           <p:cNvSpPr txBox="1"/>
           <p:nvPr>
             <p:ph idx="1" type="body"/>
@@ -1326,7 +1326,7 @@
   <p:cSld>
     <p:spTree>
       <p:nvGrpSpPr>
-        <p:cNvPr id="166" name="Shape 166"/>
+        <p:cNvPr id="165" name="Shape 165"/>
         <p:cNvGrpSpPr/>
         <p:nvPr/>
       </p:nvGrpSpPr>
@@ -1340,7 +1340,7 @@
       </p:grpSpPr>
       <p:sp>
         <p:nvSpPr>
-          <p:cNvPr id="167" name="Google Shape;167;g6eab8a76fd_0_106:notes"/>
+          <p:cNvPr id="166" name="Google Shape;166;g6eab8a76fd_0_106:notes"/>
           <p:cNvSpPr/>
           <p:nvPr>
             <p:ph idx="2" type="sldImg"/>
@@ -1375,7 +1375,7 @@
       </p:sp>
       <p:sp>
         <p:nvSpPr>
-          <p:cNvPr id="168" name="Google Shape;168;g6eab8a76fd_0_106:notes"/>
+          <p:cNvPr id="167" name="Google Shape;167;g6eab8a76fd_0_106:notes"/>
           <p:cNvSpPr txBox="1"/>
           <p:nvPr>
             <p:ph idx="1" type="body"/>
@@ -1425,7 +1425,7 @@
   <p:cSld>
     <p:spTree>
       <p:nvGrpSpPr>
-        <p:cNvPr id="174" name="Shape 174"/>
+        <p:cNvPr id="173" name="Shape 173"/>
         <p:cNvGrpSpPr/>
         <p:nvPr/>
       </p:nvGrpSpPr>
@@ -1439,7 +1439,7 @@
       </p:grpSpPr>
       <p:sp>
         <p:nvSpPr>
-          <p:cNvPr id="175" name="Google Shape;175;g6eab8a76fd_0_117:notes"/>
+          <p:cNvPr id="174" name="Google Shape;174;g6eab8a76fd_0_117:notes"/>
           <p:cNvSpPr/>
           <p:nvPr>
             <p:ph idx="2" type="sldImg"/>
@@ -1474,7 +1474,7 @@
       </p:sp>
       <p:sp>
         <p:nvSpPr>
-          <p:cNvPr id="176" name="Google Shape;176;g6eab8a76fd_0_117:notes"/>
+          <p:cNvPr id="175" name="Google Shape;175;g6eab8a76fd_0_117:notes"/>
           <p:cNvSpPr txBox="1"/>
           <p:nvPr>
             <p:ph idx="1" type="body"/>
@@ -1524,7 +1524,7 @@
   <p:cSld>
     <p:spTree>
       <p:nvGrpSpPr>
-        <p:cNvPr id="183" name="Shape 183"/>
+        <p:cNvPr id="182" name="Shape 182"/>
         <p:cNvGrpSpPr/>
         <p:nvPr/>
       </p:nvGrpSpPr>
@@ -1538,7 +1538,7 @@
       </p:grpSpPr>
       <p:sp>
         <p:nvSpPr>
-          <p:cNvPr id="184" name="Google Shape;184;g6eab8a76fd_0_128:notes"/>
+          <p:cNvPr id="183" name="Google Shape;183;g6eab8a76fd_0_128:notes"/>
           <p:cNvSpPr/>
           <p:nvPr>
             <p:ph idx="2" type="sldImg"/>
@@ -1573,7 +1573,7 @@
       </p:sp>
       <p:sp>
         <p:nvSpPr>
-          <p:cNvPr id="185" name="Google Shape;185;g6eab8a76fd_0_128:notes"/>
+          <p:cNvPr id="184" name="Google Shape;184;g6eab8a76fd_0_128:notes"/>
           <p:cNvSpPr txBox="1"/>
           <p:nvPr>
             <p:ph idx="1" type="body"/>
@@ -1623,7 +1623,7 @@
   <p:cSld>
     <p:spTree>
       <p:nvGrpSpPr>
-        <p:cNvPr id="193" name="Shape 193"/>
+        <p:cNvPr id="192" name="Shape 192"/>
         <p:cNvGrpSpPr/>
         <p:nvPr/>
       </p:nvGrpSpPr>
@@ -1637,7 +1637,7 @@
       </p:grpSpPr>
       <p:sp>
         <p:nvSpPr>
-          <p:cNvPr id="194" name="Google Shape;194;g6eab8a76fd_0_141:notes"/>
+          <p:cNvPr id="193" name="Google Shape;193;g6eab8a76fd_0_141:notes"/>
           <p:cNvSpPr/>
           <p:nvPr>
             <p:ph idx="2" type="sldImg"/>
@@ -1672,7 +1672,7 @@
       </p:sp>
       <p:sp>
         <p:nvSpPr>
-          <p:cNvPr id="195" name="Google Shape;195;g6eab8a76fd_0_141:notes"/>
+          <p:cNvPr id="194" name="Google Shape;194;g6eab8a76fd_0_141:notes"/>
           <p:cNvSpPr txBox="1"/>
           <p:nvPr>
             <p:ph idx="1" type="body"/>
@@ -1722,7 +1722,7 @@
   <p:cSld>
     <p:spTree>
       <p:nvGrpSpPr>
-        <p:cNvPr id="201" name="Shape 201"/>
+        <p:cNvPr id="200" name="Shape 200"/>
         <p:cNvGrpSpPr/>
         <p:nvPr/>
       </p:nvGrpSpPr>
@@ -1736,7 +1736,7 @@
       </p:grpSpPr>
       <p:sp>
         <p:nvSpPr>
-          <p:cNvPr id="202" name="Google Shape;202;g6eab8a76fd_0_152:notes"/>
+          <p:cNvPr id="201" name="Google Shape;201;g6eab8a76fd_0_152:notes"/>
           <p:cNvSpPr/>
           <p:nvPr>
             <p:ph idx="2" type="sldImg"/>
@@ -1771,7 +1771,7 @@
       </p:sp>
       <p:sp>
         <p:nvSpPr>
-          <p:cNvPr id="203" name="Google Shape;203;g6eab8a76fd_0_152:notes"/>
+          <p:cNvPr id="202" name="Google Shape;202;g6eab8a76fd_0_152:notes"/>
           <p:cNvSpPr txBox="1"/>
           <p:nvPr>
             <p:ph idx="1" type="body"/>
@@ -1920,7 +1920,7 @@
   <p:cSld>
     <p:spTree>
       <p:nvGrpSpPr>
-        <p:cNvPr id="209" name="Shape 209"/>
+        <p:cNvPr id="208" name="Shape 208"/>
         <p:cNvGrpSpPr/>
         <p:nvPr/>
       </p:nvGrpSpPr>
@@ -1934,7 +1934,7 @@
       </p:grpSpPr>
       <p:sp>
         <p:nvSpPr>
-          <p:cNvPr id="210" name="Google Shape;210;g6eab8a76fd_0_161:notes"/>
+          <p:cNvPr id="209" name="Google Shape;209;g6eab8a76fd_0_161:notes"/>
           <p:cNvSpPr/>
           <p:nvPr>
             <p:ph idx="2" type="sldImg"/>
@@ -1969,7 +1969,7 @@
       </p:sp>
       <p:sp>
         <p:nvSpPr>
-          <p:cNvPr id="211" name="Google Shape;211;g6eab8a76fd_0_161:notes"/>
+          <p:cNvPr id="210" name="Google Shape;210;g6eab8a76fd_0_161:notes"/>
           <p:cNvSpPr txBox="1"/>
           <p:nvPr>
             <p:ph idx="1" type="body"/>
@@ -2019,7 +2019,7 @@
   <p:cSld>
     <p:spTree>
       <p:nvGrpSpPr>
-        <p:cNvPr id="217" name="Shape 217"/>
+        <p:cNvPr id="216" name="Shape 216"/>
         <p:cNvGrpSpPr/>
         <p:nvPr/>
       </p:nvGrpSpPr>
@@ -2033,7 +2033,7 @@
       </p:grpSpPr>
       <p:sp>
         <p:nvSpPr>
-          <p:cNvPr id="218" name="Google Shape;218;g6eab8a76fd_0_170:notes"/>
+          <p:cNvPr id="217" name="Google Shape;217;g6eab8a76fd_0_170:notes"/>
           <p:cNvSpPr/>
           <p:nvPr>
             <p:ph idx="2" type="sldImg"/>
@@ -2068,7 +2068,7 @@
       </p:sp>
       <p:sp>
         <p:nvSpPr>
-          <p:cNvPr id="219" name="Google Shape;219;g6eab8a76fd_0_170:notes"/>
+          <p:cNvPr id="218" name="Google Shape;218;g6eab8a76fd_0_170:notes"/>
           <p:cNvSpPr txBox="1"/>
           <p:nvPr>
             <p:ph idx="1" type="body"/>
@@ -2118,7 +2118,7 @@
   <p:cSld>
     <p:spTree>
       <p:nvGrpSpPr>
-        <p:cNvPr id="226" name="Shape 226"/>
+        <p:cNvPr id="225" name="Shape 225"/>
         <p:cNvGrpSpPr/>
         <p:nvPr/>
       </p:nvGrpSpPr>
@@ -2132,7 +2132,7 @@
       </p:grpSpPr>
       <p:sp>
         <p:nvSpPr>
-          <p:cNvPr id="227" name="Google Shape;227;g6eab8a76fd_0_181:notes"/>
+          <p:cNvPr id="226" name="Google Shape;226;g6eab8a76fd_0_181:notes"/>
           <p:cNvSpPr/>
           <p:nvPr>
             <p:ph idx="2" type="sldImg"/>
@@ -2167,7 +2167,7 @@
       </p:sp>
       <p:sp>
         <p:nvSpPr>
-          <p:cNvPr id="228" name="Google Shape;228;g6eab8a76fd_0_181:notes"/>
+          <p:cNvPr id="227" name="Google Shape;227;g6eab8a76fd_0_181:notes"/>
           <p:cNvSpPr txBox="1"/>
           <p:nvPr>
             <p:ph idx="1" type="body"/>
@@ -2217,7 +2217,7 @@
   <p:cSld>
     <p:spTree>
       <p:nvGrpSpPr>
-        <p:cNvPr id="234" name="Shape 234"/>
+        <p:cNvPr id="233" name="Shape 233"/>
         <p:cNvGrpSpPr/>
         <p:nvPr/>
       </p:nvGrpSpPr>
@@ -2231,7 +2231,7 @@
       </p:grpSpPr>
       <p:sp>
         <p:nvSpPr>
-          <p:cNvPr id="235" name="Google Shape;235;g6eab8a76fd_0_191:notes"/>
+          <p:cNvPr id="234" name="Google Shape;234;g6eab8a76fd_0_191:notes"/>
           <p:cNvSpPr/>
           <p:nvPr>
             <p:ph idx="2" type="sldImg"/>
@@ -2266,7 +2266,7 @@
       </p:sp>
       <p:sp>
         <p:nvSpPr>
-          <p:cNvPr id="236" name="Google Shape;236;g6eab8a76fd_0_191:notes"/>
+          <p:cNvPr id="235" name="Google Shape;235;g6eab8a76fd_0_191:notes"/>
           <p:cNvSpPr txBox="1"/>
           <p:nvPr>
             <p:ph idx="1" type="body"/>
@@ -2316,7 +2316,7 @@
   <p:cSld>
     <p:spTree>
       <p:nvGrpSpPr>
-        <p:cNvPr id="241" name="Shape 241"/>
+        <p:cNvPr id="240" name="Shape 240"/>
         <p:cNvGrpSpPr/>
         <p:nvPr/>
       </p:nvGrpSpPr>
@@ -2330,7 +2330,7 @@
       </p:grpSpPr>
       <p:sp>
         <p:nvSpPr>
-          <p:cNvPr id="242" name="Google Shape;242;g6eab8a76fd_0_198:notes"/>
+          <p:cNvPr id="241" name="Google Shape;241;g6eab8a76fd_0_198:notes"/>
           <p:cNvSpPr/>
           <p:nvPr>
             <p:ph idx="2" type="sldImg"/>
@@ -2365,7 +2365,7 @@
       </p:sp>
       <p:sp>
         <p:nvSpPr>
-          <p:cNvPr id="243" name="Google Shape;243;g6eab8a76fd_0_198:notes"/>
+          <p:cNvPr id="242" name="Google Shape;242;g6eab8a76fd_0_198:notes"/>
           <p:cNvSpPr txBox="1"/>
           <p:nvPr>
             <p:ph idx="1" type="body"/>
@@ -2415,7 +2415,7 @@
   <p:cSld>
     <p:spTree>
       <p:nvGrpSpPr>
-        <p:cNvPr id="250" name="Shape 250"/>
+        <p:cNvPr id="249" name="Shape 249"/>
         <p:cNvGrpSpPr/>
         <p:nvPr/>
       </p:nvGrpSpPr>
@@ -2429,7 +2429,7 @@
       </p:grpSpPr>
       <p:sp>
         <p:nvSpPr>
-          <p:cNvPr id="251" name="Google Shape;251;g6eab8a76fd_0_208:notes"/>
+          <p:cNvPr id="250" name="Google Shape;250;g6eab8a76fd_0_208:notes"/>
           <p:cNvSpPr/>
           <p:nvPr>
             <p:ph idx="2" type="sldImg"/>
@@ -2464,7 +2464,7 @@
       </p:sp>
       <p:sp>
         <p:nvSpPr>
-          <p:cNvPr id="252" name="Google Shape;252;g6eab8a76fd_0_208:notes"/>
+          <p:cNvPr id="251" name="Google Shape;251;g6eab8a76fd_0_208:notes"/>
           <p:cNvSpPr txBox="1"/>
           <p:nvPr>
             <p:ph idx="1" type="body"/>
@@ -2514,7 +2514,7 @@
   <p:cSld>
     <p:spTree>
       <p:nvGrpSpPr>
-        <p:cNvPr id="260" name="Shape 260"/>
+        <p:cNvPr id="259" name="Shape 259"/>
         <p:cNvGrpSpPr/>
         <p:nvPr/>
       </p:nvGrpSpPr>
@@ -2528,7 +2528,7 @@
       </p:grpSpPr>
       <p:sp>
         <p:nvSpPr>
-          <p:cNvPr id="261" name="Google Shape;261;g6eab8a76fd_0_222:notes"/>
+          <p:cNvPr id="260" name="Google Shape;260;g6eab8a76fd_0_222:notes"/>
           <p:cNvSpPr/>
           <p:nvPr>
             <p:ph idx="2" type="sldImg"/>
@@ -2563,7 +2563,7 @@
       </p:sp>
       <p:sp>
         <p:nvSpPr>
-          <p:cNvPr id="262" name="Google Shape;262;g6eab8a76fd_0_222:notes"/>
+          <p:cNvPr id="261" name="Google Shape;261;g6eab8a76fd_0_222:notes"/>
           <p:cNvSpPr txBox="1"/>
           <p:nvPr>
             <p:ph idx="1" type="body"/>
@@ -2613,7 +2613,7 @@
   <p:cSld>
     <p:spTree>
       <p:nvGrpSpPr>
-        <p:cNvPr id="267" name="Shape 267"/>
+        <p:cNvPr id="266" name="Shape 266"/>
         <p:cNvGrpSpPr/>
         <p:nvPr/>
       </p:nvGrpSpPr>
@@ -2627,7 +2627,7 @@
       </p:grpSpPr>
       <p:sp>
         <p:nvSpPr>
-          <p:cNvPr id="268" name="Google Shape;268;g6eab8a76fd_0_231:notes"/>
+          <p:cNvPr id="267" name="Google Shape;267;g6eab8a76fd_0_231:notes"/>
           <p:cNvSpPr/>
           <p:nvPr>
             <p:ph idx="2" type="sldImg"/>
@@ -2662,7 +2662,7 @@
       </p:sp>
       <p:sp>
         <p:nvSpPr>
-          <p:cNvPr id="269" name="Google Shape;269;g6eab8a76fd_0_231:notes"/>
+          <p:cNvPr id="268" name="Google Shape;268;g6eab8a76fd_0_231:notes"/>
           <p:cNvSpPr txBox="1"/>
           <p:nvPr>
             <p:ph idx="1" type="body"/>
@@ -2712,7 +2712,7 @@
   <p:cSld>
     <p:spTree>
       <p:nvGrpSpPr>
-        <p:cNvPr id="275" name="Shape 275"/>
+        <p:cNvPr id="274" name="Shape 274"/>
         <p:cNvGrpSpPr/>
         <p:nvPr/>
       </p:nvGrpSpPr>
@@ -2726,7 +2726,7 @@
       </p:grpSpPr>
       <p:sp>
         <p:nvSpPr>
-          <p:cNvPr id="276" name="Google Shape;276;g6eab8a76fd_0_239:notes"/>
+          <p:cNvPr id="275" name="Google Shape;275;g6eab8a76fd_0_239:notes"/>
           <p:cNvSpPr/>
           <p:nvPr>
             <p:ph idx="2" type="sldImg"/>
@@ -2761,7 +2761,7 @@
       </p:sp>
       <p:sp>
         <p:nvSpPr>
-          <p:cNvPr id="277" name="Google Shape;277;g6eab8a76fd_0_239:notes"/>
+          <p:cNvPr id="276" name="Google Shape;276;g6eab8a76fd_0_239:notes"/>
           <p:cNvSpPr txBox="1"/>
           <p:nvPr>
             <p:ph idx="1" type="body"/>
@@ -2811,7 +2811,7 @@
   <p:cSld>
     <p:spTree>
       <p:nvGrpSpPr>
-        <p:cNvPr id="283" name="Shape 283"/>
+        <p:cNvPr id="282" name="Shape 282"/>
         <p:cNvGrpSpPr/>
         <p:nvPr/>
       </p:nvGrpSpPr>
@@ -2825,7 +2825,7 @@
       </p:grpSpPr>
       <p:sp>
         <p:nvSpPr>
-          <p:cNvPr id="284" name="Google Shape;284;g6eab8a76fd_0_248:notes"/>
+          <p:cNvPr id="283" name="Google Shape;283;g6eab8a76fd_0_248:notes"/>
           <p:cNvSpPr/>
           <p:nvPr>
             <p:ph idx="2" type="sldImg"/>
@@ -2860,7 +2860,7 @@
       </p:sp>
       <p:sp>
         <p:nvSpPr>
-          <p:cNvPr id="285" name="Google Shape;285;g6eab8a76fd_0_248:notes"/>
+          <p:cNvPr id="284" name="Google Shape;284;g6eab8a76fd_0_248:notes"/>
           <p:cNvSpPr txBox="1"/>
           <p:nvPr>
             <p:ph idx="1" type="body"/>
@@ -3009,7 +3009,7 @@
   <p:cSld>
     <p:spTree>
       <p:nvGrpSpPr>
-        <p:cNvPr id="291" name="Shape 291"/>
+        <p:cNvPr id="290" name="Shape 290"/>
         <p:cNvGrpSpPr/>
         <p:nvPr/>
       </p:nvGrpSpPr>
@@ -3023,7 +3023,7 @@
       </p:grpSpPr>
       <p:sp>
         <p:nvSpPr>
-          <p:cNvPr id="292" name="Google Shape;292;g6eab8a76fd_0_257:notes"/>
+          <p:cNvPr id="291" name="Google Shape;291;g6eab8a76fd_0_257:notes"/>
           <p:cNvSpPr/>
           <p:nvPr>
             <p:ph idx="2" type="sldImg"/>
@@ -3058,7 +3058,7 @@
       </p:sp>
       <p:sp>
         <p:nvSpPr>
-          <p:cNvPr id="293" name="Google Shape;293;g6eab8a76fd_0_257:notes"/>
+          <p:cNvPr id="292" name="Google Shape;292;g6eab8a76fd_0_257:notes"/>
           <p:cNvSpPr txBox="1"/>
           <p:nvPr>
             <p:ph idx="1" type="body"/>
@@ -3108,7 +3108,7 @@
   <p:cSld>
     <p:spTree>
       <p:nvGrpSpPr>
-        <p:cNvPr id="301" name="Shape 301"/>
+        <p:cNvPr id="300" name="Shape 300"/>
         <p:cNvGrpSpPr/>
         <p:nvPr/>
       </p:nvGrpSpPr>
@@ -3122,7 +3122,7 @@
       </p:grpSpPr>
       <p:sp>
         <p:nvSpPr>
-          <p:cNvPr id="302" name="Google Shape;302;g6eab8a76fd_0_267:notes"/>
+          <p:cNvPr id="301" name="Google Shape;301;g6eab8a76fd_0_267:notes"/>
           <p:cNvSpPr/>
           <p:nvPr>
             <p:ph idx="2" type="sldImg"/>
@@ -3157,7 +3157,7 @@
       </p:sp>
       <p:sp>
         <p:nvSpPr>
-          <p:cNvPr id="303" name="Google Shape;303;g6eab8a76fd_0_267:notes"/>
+          <p:cNvPr id="302" name="Google Shape;302;g6eab8a76fd_0_267:notes"/>
           <p:cNvSpPr txBox="1"/>
           <p:nvPr>
             <p:ph idx="1" type="body"/>
@@ -3207,7 +3207,7 @@
   <p:cSld>
     <p:spTree>
       <p:nvGrpSpPr>
-        <p:cNvPr id="310" name="Shape 310"/>
+        <p:cNvPr id="309" name="Shape 309"/>
         <p:cNvGrpSpPr/>
         <p:nvPr/>
       </p:nvGrpSpPr>
@@ -3221,7 +3221,7 @@
       </p:grpSpPr>
       <p:sp>
         <p:nvSpPr>
-          <p:cNvPr id="311" name="Google Shape;311;g6eab8a76fd_0_280:notes"/>
+          <p:cNvPr id="310" name="Google Shape;310;g6eab8a76fd_0_280:notes"/>
           <p:cNvSpPr/>
           <p:nvPr>
             <p:ph idx="2" type="sldImg"/>
@@ -3256,7 +3256,7 @@
       </p:sp>
       <p:sp>
         <p:nvSpPr>
-          <p:cNvPr id="312" name="Google Shape;312;g6eab8a76fd_0_280:notes"/>
+          <p:cNvPr id="311" name="Google Shape;311;g6eab8a76fd_0_280:notes"/>
           <p:cNvSpPr txBox="1"/>
           <p:nvPr>
             <p:ph idx="1" type="body"/>
@@ -3306,7 +3306,7 @@
   <p:cSld>
     <p:spTree>
       <p:nvGrpSpPr>
-        <p:cNvPr id="325" name="Shape 325"/>
+        <p:cNvPr id="324" name="Shape 324"/>
         <p:cNvGrpSpPr/>
         <p:nvPr/>
       </p:nvGrpSpPr>
@@ -3320,7 +3320,7 @@
       </p:grpSpPr>
       <p:sp>
         <p:nvSpPr>
-          <p:cNvPr id="326" name="Google Shape;326;g7d510cf431_2_140:notes"/>
+          <p:cNvPr id="325" name="Google Shape;325;g7d510cf431_2_140:notes"/>
           <p:cNvSpPr/>
           <p:nvPr>
             <p:ph idx="2" type="sldImg"/>
@@ -3355,7 +3355,7 @@
       </p:sp>
       <p:sp>
         <p:nvSpPr>
-          <p:cNvPr id="327" name="Google Shape;327;g7d510cf431_2_140:notes"/>
+          <p:cNvPr id="326" name="Google Shape;326;g7d510cf431_2_140:notes"/>
           <p:cNvSpPr txBox="1"/>
           <p:nvPr>
             <p:ph idx="1" type="body"/>
@@ -8976,7 +8976,7 @@
   <p:cSld>
     <p:spTree>
       <p:nvGrpSpPr>
-        <p:cNvPr id="129" name="Shape 129"/>
+        <p:cNvPr id="128" name="Shape 128"/>
         <p:cNvGrpSpPr/>
         <p:nvPr/>
       </p:nvGrpSpPr>
@@ -8990,7 +8990,7 @@
       </p:grpSpPr>
       <p:sp>
         <p:nvSpPr>
-          <p:cNvPr id="130" name="Google Shape;130;p22"/>
+          <p:cNvPr id="129" name="Google Shape;129;p22"/>
           <p:cNvSpPr txBox="1"/>
           <p:nvPr>
             <p:ph type="title"/>
@@ -9041,7 +9041,7 @@
       </p:sp>
       <p:sp>
         <p:nvSpPr>
-          <p:cNvPr id="131" name="Google Shape;131;p22"/>
+          <p:cNvPr id="130" name="Google Shape;130;p22"/>
           <p:cNvSpPr txBox="1"/>
           <p:nvPr>
             <p:ph idx="12" type="sldNum"/>
@@ -9081,7 +9081,7 @@
       </p:sp>
       <p:sp>
         <p:nvSpPr>
-          <p:cNvPr id="132" name="Google Shape;132;p22"/>
+          <p:cNvPr id="131" name="Google Shape;131;p22"/>
           <p:cNvSpPr txBox="1"/>
           <p:nvPr/>
         </p:nvSpPr>
@@ -9289,7 +9289,7 @@
       </p:sp>
       <p:graphicFrame>
         <p:nvGraphicFramePr>
-          <p:cNvPr id="133" name="Google Shape;133;p22"/>
+          <p:cNvPr id="132" name="Google Shape;132;p22"/>
           <p:cNvGraphicFramePr/>
           <p:nvPr/>
         </p:nvGraphicFramePr>
@@ -9302,7 +9302,7 @@
             <a:tbl>
               <a:tblPr>
                 <a:noFill/>
-                <a:tableStyleId>{EB5EDB20-0582-42D3-A986-4CF8D7EC857A}</a:tableStyleId>
+                <a:tableStyleId>{D3737B69-F30C-4F95-9426-545B7725F03C}</a:tableStyleId>
               </a:tblPr>
               <a:tblGrid>
                 <a:gridCol w="4833300"/>
@@ -10504,7 +10504,7 @@
       </p:graphicFrame>
       <p:sp>
         <p:nvSpPr>
-          <p:cNvPr id="134" name="Google Shape;134;p22"/>
+          <p:cNvPr id="133" name="Google Shape;133;p22"/>
           <p:cNvSpPr txBox="1"/>
           <p:nvPr/>
         </p:nvSpPr>
@@ -10574,7 +10574,7 @@
   <p:cSld>
     <p:spTree>
       <p:nvGrpSpPr>
-        <p:cNvPr id="138" name="Shape 138"/>
+        <p:cNvPr id="137" name="Shape 137"/>
         <p:cNvGrpSpPr/>
         <p:nvPr/>
       </p:nvGrpSpPr>
@@ -10588,7 +10588,7 @@
       </p:grpSpPr>
       <p:sp>
         <p:nvSpPr>
-          <p:cNvPr id="139" name="Google Shape;139;p23"/>
+          <p:cNvPr id="138" name="Google Shape;138;p23"/>
           <p:cNvSpPr txBox="1"/>
           <p:nvPr>
             <p:ph type="title"/>
@@ -10639,7 +10639,7 @@
       </p:sp>
       <p:sp>
         <p:nvSpPr>
-          <p:cNvPr id="140" name="Google Shape;140;p23"/>
+          <p:cNvPr id="139" name="Google Shape;139;p23"/>
           <p:cNvSpPr txBox="1"/>
           <p:nvPr>
             <p:ph idx="12" type="sldNum"/>
@@ -10679,7 +10679,7 @@
       </p:sp>
       <p:sp>
         <p:nvSpPr>
-          <p:cNvPr id="141" name="Google Shape;141;p23"/>
+          <p:cNvPr id="140" name="Google Shape;140;p23"/>
           <p:cNvSpPr txBox="1"/>
           <p:nvPr/>
         </p:nvSpPr>
@@ -10987,7 +10987,7 @@
   <p:cSld>
     <p:spTree>
       <p:nvGrpSpPr>
-        <p:cNvPr id="145" name="Shape 145"/>
+        <p:cNvPr id="144" name="Shape 144"/>
         <p:cNvGrpSpPr/>
         <p:nvPr/>
       </p:nvGrpSpPr>
@@ -11001,7 +11001,7 @@
       </p:grpSpPr>
       <p:sp>
         <p:nvSpPr>
-          <p:cNvPr id="146" name="Google Shape;146;p24"/>
+          <p:cNvPr id="145" name="Google Shape;145;p24"/>
           <p:cNvSpPr txBox="1"/>
           <p:nvPr>
             <p:ph type="title"/>
@@ -11052,7 +11052,7 @@
       </p:sp>
       <p:sp>
         <p:nvSpPr>
-          <p:cNvPr id="147" name="Google Shape;147;p24"/>
+          <p:cNvPr id="146" name="Google Shape;146;p24"/>
           <p:cNvSpPr txBox="1"/>
           <p:nvPr>
             <p:ph idx="12" type="sldNum"/>
@@ -11092,7 +11092,7 @@
       </p:sp>
       <p:pic>
         <p:nvPicPr>
-          <p:cNvPr id="148" name="Google Shape;148;p24"/>
+          <p:cNvPr id="147" name="Google Shape;147;p24"/>
           <p:cNvPicPr preferRelativeResize="0"/>
           <p:nvPr/>
         </p:nvPicPr>
@@ -11131,7 +11131,7 @@
   <p:cSld>
     <p:spTree>
       <p:nvGrpSpPr>
-        <p:cNvPr id="152" name="Shape 152"/>
+        <p:cNvPr id="151" name="Shape 151"/>
         <p:cNvGrpSpPr/>
         <p:nvPr/>
       </p:nvGrpSpPr>
@@ -11145,7 +11145,7 @@
       </p:grpSpPr>
       <p:sp>
         <p:nvSpPr>
-          <p:cNvPr id="153" name="Google Shape;153;p25"/>
+          <p:cNvPr id="152" name="Google Shape;152;p25"/>
           <p:cNvSpPr txBox="1"/>
           <p:nvPr>
             <p:ph type="title"/>
@@ -11196,7 +11196,7 @@
       </p:sp>
       <p:sp>
         <p:nvSpPr>
-          <p:cNvPr id="154" name="Google Shape;154;p25"/>
+          <p:cNvPr id="153" name="Google Shape;153;p25"/>
           <p:cNvSpPr txBox="1"/>
           <p:nvPr>
             <p:ph idx="12" type="sldNum"/>
@@ -11236,7 +11236,7 @@
       </p:sp>
       <p:sp>
         <p:nvSpPr>
-          <p:cNvPr id="155" name="Google Shape;155;p25"/>
+          <p:cNvPr id="154" name="Google Shape;154;p25"/>
           <p:cNvSpPr txBox="1"/>
           <p:nvPr/>
         </p:nvSpPr>
@@ -11329,7 +11329,7 @@
       </p:sp>
       <p:graphicFrame>
         <p:nvGraphicFramePr>
-          <p:cNvPr id="156" name="Google Shape;156;p25"/>
+          <p:cNvPr id="155" name="Google Shape;155;p25"/>
           <p:cNvGraphicFramePr/>
           <p:nvPr/>
         </p:nvGraphicFramePr>
@@ -11342,7 +11342,7 @@
             <a:tbl>
               <a:tblPr>
                 <a:noFill/>
-                <a:tableStyleId>{EB5EDB20-0582-42D3-A986-4CF8D7EC857A}</a:tableStyleId>
+                <a:tableStyleId>{D3737B69-F30C-4F95-9426-545B7725F03C}</a:tableStyleId>
               </a:tblPr>
               <a:tblGrid>
                 <a:gridCol w="4194300"/>
@@ -12323,7 +12323,7 @@
       </p:graphicFrame>
       <p:graphicFrame>
         <p:nvGraphicFramePr>
-          <p:cNvPr id="157" name="Google Shape;157;p25"/>
+          <p:cNvPr id="156" name="Google Shape;156;p25"/>
           <p:cNvGraphicFramePr/>
           <p:nvPr/>
         </p:nvGraphicFramePr>
@@ -12336,7 +12336,7 @@
             <a:tbl>
               <a:tblPr>
                 <a:noFill/>
-                <a:tableStyleId>{EB5EDB20-0582-42D3-A986-4CF8D7EC857A}</a:tableStyleId>
+                <a:tableStyleId>{D3737B69-F30C-4F95-9426-545B7725F03C}</a:tableStyleId>
               </a:tblPr>
               <a:tblGrid>
                 <a:gridCol w="4017125"/>
@@ -13503,7 +13503,7 @@
   <p:cSld>
     <p:spTree>
       <p:nvGrpSpPr>
-        <p:cNvPr id="161" name="Shape 161"/>
+        <p:cNvPr id="160" name="Shape 160"/>
         <p:cNvGrpSpPr/>
         <p:nvPr/>
       </p:nvGrpSpPr>
@@ -13517,7 +13517,7 @@
       </p:grpSpPr>
       <p:sp>
         <p:nvSpPr>
-          <p:cNvPr id="162" name="Google Shape;162;p26"/>
+          <p:cNvPr id="161" name="Google Shape;161;p26"/>
           <p:cNvSpPr txBox="1"/>
           <p:nvPr>
             <p:ph type="title"/>
@@ -13568,7 +13568,7 @@
       </p:sp>
       <p:sp>
         <p:nvSpPr>
-          <p:cNvPr id="163" name="Google Shape;163;p26"/>
+          <p:cNvPr id="162" name="Google Shape;162;p26"/>
           <p:cNvSpPr txBox="1"/>
           <p:nvPr>
             <p:ph idx="12" type="sldNum"/>
@@ -13608,7 +13608,7 @@
       </p:sp>
       <p:sp>
         <p:nvSpPr>
-          <p:cNvPr id="164" name="Google Shape;164;p26"/>
+          <p:cNvPr id="163" name="Google Shape;163;p26"/>
           <p:cNvSpPr txBox="1"/>
           <p:nvPr/>
         </p:nvSpPr>
@@ -13677,7 +13677,7 @@
       </p:sp>
       <p:pic>
         <p:nvPicPr>
-          <p:cNvPr id="165" name="Google Shape;165;p26"/>
+          <p:cNvPr id="164" name="Google Shape;164;p26"/>
           <p:cNvPicPr preferRelativeResize="0"/>
           <p:nvPr/>
         </p:nvPicPr>
@@ -13716,7 +13716,7 @@
   <p:cSld>
     <p:spTree>
       <p:nvGrpSpPr>
-        <p:cNvPr id="169" name="Shape 169"/>
+        <p:cNvPr id="168" name="Shape 168"/>
         <p:cNvGrpSpPr/>
         <p:nvPr/>
       </p:nvGrpSpPr>
@@ -13730,7 +13730,7 @@
       </p:grpSpPr>
       <p:sp>
         <p:nvSpPr>
-          <p:cNvPr id="170" name="Google Shape;170;p27"/>
+          <p:cNvPr id="169" name="Google Shape;169;p27"/>
           <p:cNvSpPr txBox="1"/>
           <p:nvPr>
             <p:ph type="title"/>
@@ -13781,7 +13781,7 @@
       </p:sp>
       <p:sp>
         <p:nvSpPr>
-          <p:cNvPr id="171" name="Google Shape;171;p27"/>
+          <p:cNvPr id="170" name="Google Shape;170;p27"/>
           <p:cNvSpPr txBox="1"/>
           <p:nvPr>
             <p:ph idx="12" type="sldNum"/>
@@ -13821,7 +13821,7 @@
       </p:sp>
       <p:sp>
         <p:nvSpPr>
-          <p:cNvPr id="172" name="Google Shape;172;p27"/>
+          <p:cNvPr id="171" name="Google Shape;171;p27"/>
           <p:cNvSpPr txBox="1"/>
           <p:nvPr/>
         </p:nvSpPr>
@@ -13944,7 +13944,7 @@
       </p:sp>
       <p:pic>
         <p:nvPicPr>
-          <p:cNvPr id="173" name="Google Shape;173;p27"/>
+          <p:cNvPr id="172" name="Google Shape;172;p27"/>
           <p:cNvPicPr preferRelativeResize="0"/>
           <p:nvPr/>
         </p:nvPicPr>
@@ -13983,7 +13983,7 @@
   <p:cSld>
     <p:spTree>
       <p:nvGrpSpPr>
-        <p:cNvPr id="177" name="Shape 177"/>
+        <p:cNvPr id="176" name="Shape 176"/>
         <p:cNvGrpSpPr/>
         <p:nvPr/>
       </p:nvGrpSpPr>
@@ -13997,7 +13997,7 @@
       </p:grpSpPr>
       <p:sp>
         <p:nvSpPr>
-          <p:cNvPr id="178" name="Google Shape;178;p28"/>
+          <p:cNvPr id="177" name="Google Shape;177;p28"/>
           <p:cNvSpPr txBox="1"/>
           <p:nvPr>
             <p:ph type="title"/>
@@ -14048,7 +14048,7 @@
       </p:sp>
       <p:sp>
         <p:nvSpPr>
-          <p:cNvPr id="179" name="Google Shape;179;p28"/>
+          <p:cNvPr id="178" name="Google Shape;178;p28"/>
           <p:cNvSpPr txBox="1"/>
           <p:nvPr>
             <p:ph idx="12" type="sldNum"/>
@@ -14088,7 +14088,7 @@
       </p:sp>
       <p:sp>
         <p:nvSpPr>
-          <p:cNvPr id="180" name="Google Shape;180;p28"/>
+          <p:cNvPr id="179" name="Google Shape;179;p28"/>
           <p:cNvSpPr txBox="1"/>
           <p:nvPr/>
         </p:nvSpPr>
@@ -14169,7 +14169,7 @@
                   <a:srgbClr val="4A86E8"/>
                 </a:solidFill>
               </a:rPr>
-              <a:t>1x1 linear projection on the identify link</a:t>
+              <a:t>1x1 bottleneck convolution on the identify link</a:t>
             </a:r>
             <a:r>
               <a:rPr lang="en" sz="1200">
@@ -14189,7 +14189,7 @@
       </p:sp>
       <p:pic>
         <p:nvPicPr>
-          <p:cNvPr id="181" name="Google Shape;181;p28"/>
+          <p:cNvPr id="180" name="Google Shape;180;p28"/>
           <p:cNvPicPr preferRelativeResize="0"/>
           <p:nvPr/>
         </p:nvPicPr>
@@ -14217,7 +14217,7 @@
       </p:pic>
       <p:sp>
         <p:nvSpPr>
-          <p:cNvPr id="182" name="Google Shape;182;p28"/>
+          <p:cNvPr id="181" name="Google Shape;181;p28"/>
           <p:cNvSpPr txBox="1"/>
           <p:nvPr/>
         </p:nvSpPr>
@@ -14360,7 +14360,7 @@
   <p:cSld>
     <p:spTree>
       <p:nvGrpSpPr>
-        <p:cNvPr id="186" name="Shape 186"/>
+        <p:cNvPr id="185" name="Shape 185"/>
         <p:cNvGrpSpPr/>
         <p:nvPr/>
       </p:nvGrpSpPr>
@@ -14374,7 +14374,7 @@
       </p:grpSpPr>
       <p:sp>
         <p:nvSpPr>
-          <p:cNvPr id="187" name="Google Shape;187;p29"/>
+          <p:cNvPr id="186" name="Google Shape;186;p29"/>
           <p:cNvSpPr txBox="1"/>
           <p:nvPr>
             <p:ph type="title"/>
@@ -14425,7 +14425,7 @@
       </p:sp>
       <p:sp>
         <p:nvSpPr>
-          <p:cNvPr id="188" name="Google Shape;188;p29"/>
+          <p:cNvPr id="187" name="Google Shape;187;p29"/>
           <p:cNvSpPr txBox="1"/>
           <p:nvPr>
             <p:ph idx="12" type="sldNum"/>
@@ -14465,7 +14465,7 @@
       </p:sp>
       <p:sp>
         <p:nvSpPr>
-          <p:cNvPr id="189" name="Google Shape;189;p29"/>
+          <p:cNvPr id="188" name="Google Shape;188;p29"/>
           <p:cNvSpPr txBox="1"/>
           <p:nvPr/>
         </p:nvSpPr>
@@ -14513,7 +14513,7 @@
       </p:sp>
       <p:graphicFrame>
         <p:nvGraphicFramePr>
-          <p:cNvPr id="190" name="Google Shape;190;p29"/>
+          <p:cNvPr id="189" name="Google Shape;189;p29"/>
           <p:cNvGraphicFramePr/>
           <p:nvPr/>
         </p:nvGraphicFramePr>
@@ -14526,7 +14526,7 @@
             <a:tbl>
               <a:tblPr>
                 <a:noFill/>
-                <a:tableStyleId>{EB5EDB20-0582-42D3-A986-4CF8D7EC857A}</a:tableStyleId>
+                <a:tableStyleId>{D3737B69-F30C-4F95-9426-545B7725F03C}</a:tableStyleId>
               </a:tblPr>
               <a:tblGrid>
                 <a:gridCol w="6108675"/>
@@ -16998,7 +16998,7 @@
       </p:graphicFrame>
       <p:sp>
         <p:nvSpPr>
-          <p:cNvPr id="191" name="Google Shape;191;p29"/>
+          <p:cNvPr id="190" name="Google Shape;190;p29"/>
           <p:cNvSpPr/>
           <p:nvPr/>
         </p:nvSpPr>
@@ -17050,7 +17050,7 @@
       </p:sp>
       <p:sp>
         <p:nvSpPr>
-          <p:cNvPr id="192" name="Google Shape;192;p29"/>
+          <p:cNvPr id="191" name="Google Shape;191;p29"/>
           <p:cNvSpPr/>
           <p:nvPr/>
         </p:nvSpPr>
@@ -17113,7 +17113,7 @@
   <p:cSld>
     <p:spTree>
       <p:nvGrpSpPr>
-        <p:cNvPr id="196" name="Shape 196"/>
+        <p:cNvPr id="195" name="Shape 195"/>
         <p:cNvGrpSpPr/>
         <p:nvPr/>
       </p:nvGrpSpPr>
@@ -17127,7 +17127,7 @@
       </p:grpSpPr>
       <p:sp>
         <p:nvSpPr>
-          <p:cNvPr id="197" name="Google Shape;197;p30"/>
+          <p:cNvPr id="196" name="Google Shape;196;p30"/>
           <p:cNvSpPr txBox="1"/>
           <p:nvPr>
             <p:ph type="title"/>
@@ -17178,7 +17178,7 @@
       </p:sp>
       <p:sp>
         <p:nvSpPr>
-          <p:cNvPr id="198" name="Google Shape;198;p30"/>
+          <p:cNvPr id="197" name="Google Shape;197;p30"/>
           <p:cNvSpPr txBox="1"/>
           <p:nvPr>
             <p:ph idx="12" type="sldNum"/>
@@ -17218,7 +17218,7 @@
       </p:sp>
       <p:sp>
         <p:nvSpPr>
-          <p:cNvPr id="199" name="Google Shape;199;p30"/>
+          <p:cNvPr id="198" name="Google Shape;198;p30"/>
           <p:cNvSpPr txBox="1"/>
           <p:nvPr/>
         </p:nvSpPr>
@@ -17278,7 +17278,7 @@
       </p:sp>
       <p:pic>
         <p:nvPicPr>
-          <p:cNvPr id="200" name="Google Shape;200;p30"/>
+          <p:cNvPr id="199" name="Google Shape;199;p30"/>
           <p:cNvPicPr preferRelativeResize="0"/>
           <p:nvPr/>
         </p:nvPicPr>
@@ -17317,7 +17317,7 @@
   <p:cSld>
     <p:spTree>
       <p:nvGrpSpPr>
-        <p:cNvPr id="204" name="Shape 204"/>
+        <p:cNvPr id="203" name="Shape 203"/>
         <p:cNvGrpSpPr/>
         <p:nvPr/>
       </p:nvGrpSpPr>
@@ -17331,7 +17331,7 @@
       </p:grpSpPr>
       <p:sp>
         <p:nvSpPr>
-          <p:cNvPr id="205" name="Google Shape;205;p31"/>
+          <p:cNvPr id="204" name="Google Shape;204;p31"/>
           <p:cNvSpPr txBox="1"/>
           <p:nvPr>
             <p:ph type="title"/>
@@ -17382,7 +17382,7 @@
       </p:sp>
       <p:sp>
         <p:nvSpPr>
-          <p:cNvPr id="206" name="Google Shape;206;p31"/>
+          <p:cNvPr id="205" name="Google Shape;205;p31"/>
           <p:cNvSpPr txBox="1"/>
           <p:nvPr>
             <p:ph idx="12" type="sldNum"/>
@@ -17422,7 +17422,7 @@
       </p:sp>
       <p:sp>
         <p:nvSpPr>
-          <p:cNvPr id="207" name="Google Shape;207;p31"/>
+          <p:cNvPr id="206" name="Google Shape;206;p31"/>
           <p:cNvSpPr txBox="1"/>
           <p:nvPr/>
         </p:nvSpPr>
@@ -17533,7 +17533,7 @@
       </p:sp>
       <p:pic>
         <p:nvPicPr>
-          <p:cNvPr id="208" name="Google Shape;208;p31"/>
+          <p:cNvPr id="207" name="Google Shape;207;p31"/>
           <p:cNvPicPr preferRelativeResize="0"/>
           <p:nvPr/>
         </p:nvPicPr>
@@ -18158,7 +18158,7 @@
   <p:cSld>
     <p:spTree>
       <p:nvGrpSpPr>
-        <p:cNvPr id="212" name="Shape 212"/>
+        <p:cNvPr id="211" name="Shape 211"/>
         <p:cNvGrpSpPr/>
         <p:nvPr/>
       </p:nvGrpSpPr>
@@ -18172,7 +18172,7 @@
       </p:grpSpPr>
       <p:sp>
         <p:nvSpPr>
-          <p:cNvPr id="213" name="Google Shape;213;p32"/>
+          <p:cNvPr id="212" name="Google Shape;212;p32"/>
           <p:cNvSpPr txBox="1"/>
           <p:nvPr>
             <p:ph type="title"/>
@@ -18223,7 +18223,7 @@
       </p:sp>
       <p:sp>
         <p:nvSpPr>
-          <p:cNvPr id="214" name="Google Shape;214;p32"/>
+          <p:cNvPr id="213" name="Google Shape;213;p32"/>
           <p:cNvSpPr txBox="1"/>
           <p:nvPr>
             <p:ph idx="12" type="sldNum"/>
@@ -18263,7 +18263,7 @@
       </p:sp>
       <p:pic>
         <p:nvPicPr>
-          <p:cNvPr id="215" name="Google Shape;215;p32"/>
+          <p:cNvPr id="214" name="Google Shape;214;p32"/>
           <p:cNvPicPr preferRelativeResize="0"/>
           <p:nvPr/>
         </p:nvPicPr>
@@ -18291,7 +18291,7 @@
       </p:pic>
       <p:sp>
         <p:nvSpPr>
-          <p:cNvPr id="216" name="Google Shape;216;p32"/>
+          <p:cNvPr id="215" name="Google Shape;215;p32"/>
           <p:cNvSpPr txBox="1"/>
           <p:nvPr/>
         </p:nvSpPr>
@@ -18526,7 +18526,7 @@
   <p:cSld>
     <p:spTree>
       <p:nvGrpSpPr>
-        <p:cNvPr id="220" name="Shape 220"/>
+        <p:cNvPr id="219" name="Shape 219"/>
         <p:cNvGrpSpPr/>
         <p:nvPr/>
       </p:nvGrpSpPr>
@@ -18540,7 +18540,7 @@
       </p:grpSpPr>
       <p:sp>
         <p:nvSpPr>
-          <p:cNvPr id="221" name="Google Shape;221;p33"/>
+          <p:cNvPr id="220" name="Google Shape;220;p33"/>
           <p:cNvSpPr txBox="1"/>
           <p:nvPr>
             <p:ph type="title"/>
@@ -18591,7 +18591,7 @@
       </p:sp>
       <p:sp>
         <p:nvSpPr>
-          <p:cNvPr id="222" name="Google Shape;222;p33"/>
+          <p:cNvPr id="221" name="Google Shape;221;p33"/>
           <p:cNvSpPr txBox="1"/>
           <p:nvPr>
             <p:ph idx="12" type="sldNum"/>
@@ -18631,7 +18631,7 @@
       </p:sp>
       <p:sp>
         <p:nvSpPr>
-          <p:cNvPr id="223" name="Google Shape;223;p33"/>
+          <p:cNvPr id="222" name="Google Shape;222;p33"/>
           <p:cNvSpPr txBox="1"/>
           <p:nvPr/>
         </p:nvSpPr>
@@ -18717,7 +18717,7 @@
                   <a:srgbClr val="4A86E8"/>
                 </a:solidFill>
               </a:rPr>
-              <a:t>1x1 linear projection</a:t>
+              <a:t>1x1 linear bottleneck</a:t>
             </a:r>
             <a:r>
               <a:rPr lang="en" sz="1200">
@@ -18807,7 +18807,7 @@
       </p:sp>
       <p:sp>
         <p:nvSpPr>
-          <p:cNvPr id="224" name="Google Shape;224;p33"/>
+          <p:cNvPr id="223" name="Google Shape;223;p33"/>
           <p:cNvSpPr txBox="1"/>
           <p:nvPr/>
         </p:nvSpPr>
@@ -18866,7 +18866,7 @@
       </p:sp>
       <p:pic>
         <p:nvPicPr>
-          <p:cNvPr id="225" name="Google Shape;225;p33"/>
+          <p:cNvPr id="224" name="Google Shape;224;p33"/>
           <p:cNvPicPr preferRelativeResize="0"/>
           <p:nvPr/>
         </p:nvPicPr>
@@ -18905,7 +18905,7 @@
   <p:cSld>
     <p:spTree>
       <p:nvGrpSpPr>
-        <p:cNvPr id="229" name="Shape 229"/>
+        <p:cNvPr id="228" name="Shape 228"/>
         <p:cNvGrpSpPr/>
         <p:nvPr/>
       </p:nvGrpSpPr>
@@ -18919,7 +18919,7 @@
       </p:grpSpPr>
       <p:sp>
         <p:nvSpPr>
-          <p:cNvPr id="230" name="Google Shape;230;p34"/>
+          <p:cNvPr id="229" name="Google Shape;229;p34"/>
           <p:cNvSpPr txBox="1"/>
           <p:nvPr>
             <p:ph type="title"/>
@@ -18970,7 +18970,7 @@
       </p:sp>
       <p:sp>
         <p:nvSpPr>
-          <p:cNvPr id="231" name="Google Shape;231;p34"/>
+          <p:cNvPr id="230" name="Google Shape;230;p34"/>
           <p:cNvSpPr txBox="1"/>
           <p:nvPr>
             <p:ph idx="12" type="sldNum"/>
@@ -19010,7 +19010,7 @@
       </p:sp>
       <p:sp>
         <p:nvSpPr>
-          <p:cNvPr id="232" name="Google Shape;232;p34"/>
+          <p:cNvPr id="231" name="Google Shape;231;p34"/>
           <p:cNvSpPr txBox="1"/>
           <p:nvPr/>
         </p:nvSpPr>
@@ -19149,7 +19149,7 @@
       </p:sp>
       <p:pic>
         <p:nvPicPr>
-          <p:cNvPr id="233" name="Google Shape;233;p34"/>
+          <p:cNvPr id="232" name="Google Shape;232;p34"/>
           <p:cNvPicPr preferRelativeResize="0"/>
           <p:nvPr/>
         </p:nvPicPr>
@@ -19188,7 +19188,7 @@
   <p:cSld>
     <p:spTree>
       <p:nvGrpSpPr>
-        <p:cNvPr id="237" name="Shape 237"/>
+        <p:cNvPr id="236" name="Shape 236"/>
         <p:cNvGrpSpPr/>
         <p:nvPr/>
       </p:nvGrpSpPr>
@@ -19202,7 +19202,7 @@
       </p:grpSpPr>
       <p:sp>
         <p:nvSpPr>
-          <p:cNvPr id="238" name="Google Shape;238;p35"/>
+          <p:cNvPr id="237" name="Google Shape;237;p35"/>
           <p:cNvSpPr txBox="1"/>
           <p:nvPr>
             <p:ph type="title"/>
@@ -19253,7 +19253,7 @@
       </p:sp>
       <p:sp>
         <p:nvSpPr>
-          <p:cNvPr id="239" name="Google Shape;239;p35"/>
+          <p:cNvPr id="238" name="Google Shape;238;p35"/>
           <p:cNvSpPr txBox="1"/>
           <p:nvPr>
             <p:ph idx="12" type="sldNum"/>
@@ -19293,7 +19293,7 @@
       </p:sp>
       <p:sp>
         <p:nvSpPr>
-          <p:cNvPr id="240" name="Google Shape;240;p35"/>
+          <p:cNvPr id="239" name="Google Shape;239;p35"/>
           <p:cNvSpPr txBox="1"/>
           <p:nvPr/>
         </p:nvSpPr>
@@ -19592,7 +19592,7 @@
   <p:cSld>
     <p:spTree>
       <p:nvGrpSpPr>
-        <p:cNvPr id="244" name="Shape 244"/>
+        <p:cNvPr id="243" name="Shape 243"/>
         <p:cNvGrpSpPr/>
         <p:nvPr/>
       </p:nvGrpSpPr>
@@ -19606,7 +19606,7 @@
       </p:grpSpPr>
       <p:sp>
         <p:nvSpPr>
-          <p:cNvPr id="245" name="Google Shape;245;p36"/>
+          <p:cNvPr id="244" name="Google Shape;244;p36"/>
           <p:cNvSpPr txBox="1"/>
           <p:nvPr>
             <p:ph type="title"/>
@@ -19657,7 +19657,7 @@
       </p:sp>
       <p:sp>
         <p:nvSpPr>
-          <p:cNvPr id="246" name="Google Shape;246;p36"/>
+          <p:cNvPr id="245" name="Google Shape;245;p36"/>
           <p:cNvSpPr txBox="1"/>
           <p:nvPr>
             <p:ph idx="12" type="sldNum"/>
@@ -19697,7 +19697,7 @@
       </p:sp>
       <p:sp>
         <p:nvSpPr>
-          <p:cNvPr id="247" name="Google Shape;247;p36"/>
+          <p:cNvPr id="246" name="Google Shape;246;p36"/>
           <p:cNvSpPr txBox="1"/>
           <p:nvPr/>
         </p:nvSpPr>
@@ -19929,7 +19929,7 @@
       </p:sp>
       <p:sp>
         <p:nvSpPr>
-          <p:cNvPr id="248" name="Google Shape;248;p36"/>
+          <p:cNvPr id="247" name="Google Shape;247;p36"/>
           <p:cNvSpPr txBox="1"/>
           <p:nvPr/>
         </p:nvSpPr>
@@ -19988,7 +19988,7 @@
       </p:sp>
       <p:pic>
         <p:nvPicPr>
-          <p:cNvPr id="249" name="Google Shape;249;p36"/>
+          <p:cNvPr id="248" name="Google Shape;248;p36"/>
           <p:cNvPicPr preferRelativeResize="0"/>
           <p:nvPr/>
         </p:nvPicPr>
@@ -20027,7 +20027,7 @@
   <p:cSld>
     <p:spTree>
       <p:nvGrpSpPr>
-        <p:cNvPr id="253" name="Shape 253"/>
+        <p:cNvPr id="252" name="Shape 252"/>
         <p:cNvGrpSpPr/>
         <p:nvPr/>
       </p:nvGrpSpPr>
@@ -20041,7 +20041,7 @@
       </p:grpSpPr>
       <p:sp>
         <p:nvSpPr>
-          <p:cNvPr id="254" name="Google Shape;254;p37"/>
+          <p:cNvPr id="253" name="Google Shape;253;p37"/>
           <p:cNvSpPr txBox="1"/>
           <p:nvPr>
             <p:ph type="title"/>
@@ -20092,7 +20092,7 @@
       </p:sp>
       <p:sp>
         <p:nvSpPr>
-          <p:cNvPr id="255" name="Google Shape;255;p37"/>
+          <p:cNvPr id="254" name="Google Shape;254;p37"/>
           <p:cNvSpPr txBox="1"/>
           <p:nvPr>
             <p:ph idx="12" type="sldNum"/>
@@ -20132,7 +20132,7 @@
       </p:sp>
       <p:sp>
         <p:nvSpPr>
-          <p:cNvPr id="256" name="Google Shape;256;p37"/>
+          <p:cNvPr id="255" name="Google Shape;255;p37"/>
           <p:cNvSpPr txBox="1"/>
           <p:nvPr/>
         </p:nvSpPr>
@@ -20345,7 +20345,7 @@
       </p:sp>
       <p:pic>
         <p:nvPicPr>
-          <p:cNvPr id="257" name="Google Shape;257;p37"/>
+          <p:cNvPr id="256" name="Google Shape;256;p37"/>
           <p:cNvPicPr preferRelativeResize="0"/>
           <p:nvPr/>
         </p:nvPicPr>
@@ -20373,7 +20373,7 @@
       </p:pic>
       <p:sp>
         <p:nvSpPr>
-          <p:cNvPr id="258" name="Google Shape;258;p37"/>
+          <p:cNvPr id="257" name="Google Shape;257;p37"/>
           <p:cNvSpPr txBox="1"/>
           <p:nvPr/>
         </p:nvSpPr>
@@ -20432,7 +20432,7 @@
       </p:sp>
       <p:sp>
         <p:nvSpPr>
-          <p:cNvPr id="259" name="Google Shape;259;p37"/>
+          <p:cNvPr id="258" name="Google Shape;258;p37"/>
           <p:cNvSpPr txBox="1"/>
           <p:nvPr/>
         </p:nvSpPr>
@@ -20502,7 +20502,7 @@
   <p:cSld>
     <p:spTree>
       <p:nvGrpSpPr>
-        <p:cNvPr id="263" name="Shape 263"/>
+        <p:cNvPr id="262" name="Shape 262"/>
         <p:cNvGrpSpPr/>
         <p:nvPr/>
       </p:nvGrpSpPr>
@@ -20516,7 +20516,7 @@
       </p:grpSpPr>
       <p:sp>
         <p:nvSpPr>
-          <p:cNvPr id="264" name="Google Shape;264;p38"/>
+          <p:cNvPr id="263" name="Google Shape;263;p38"/>
           <p:cNvSpPr txBox="1"/>
           <p:nvPr>
             <p:ph type="title"/>
@@ -20567,7 +20567,7 @@
       </p:sp>
       <p:sp>
         <p:nvSpPr>
-          <p:cNvPr id="265" name="Google Shape;265;p38"/>
+          <p:cNvPr id="264" name="Google Shape;264;p38"/>
           <p:cNvSpPr txBox="1"/>
           <p:nvPr>
             <p:ph idx="12" type="sldNum"/>
@@ -20607,7 +20607,7 @@
       </p:sp>
       <p:sp>
         <p:nvSpPr>
-          <p:cNvPr id="266" name="Google Shape;266;p38"/>
+          <p:cNvPr id="265" name="Google Shape;265;p38"/>
           <p:cNvSpPr txBox="1"/>
           <p:nvPr/>
         </p:nvSpPr>
@@ -21002,7 +21002,7 @@
   <p:cSld>
     <p:spTree>
       <p:nvGrpSpPr>
-        <p:cNvPr id="270" name="Shape 270"/>
+        <p:cNvPr id="269" name="Shape 269"/>
         <p:cNvGrpSpPr/>
         <p:nvPr/>
       </p:nvGrpSpPr>
@@ -21016,7 +21016,7 @@
       </p:grpSpPr>
       <p:sp>
         <p:nvSpPr>
-          <p:cNvPr id="271" name="Google Shape;271;p39"/>
+          <p:cNvPr id="270" name="Google Shape;270;p39"/>
           <p:cNvSpPr txBox="1"/>
           <p:nvPr>
             <p:ph type="title"/>
@@ -21067,7 +21067,7 @@
       </p:sp>
       <p:sp>
         <p:nvSpPr>
-          <p:cNvPr id="272" name="Google Shape;272;p39"/>
+          <p:cNvPr id="271" name="Google Shape;271;p39"/>
           <p:cNvSpPr txBox="1"/>
           <p:nvPr>
             <p:ph idx="12" type="sldNum"/>
@@ -21107,7 +21107,7 @@
       </p:sp>
       <p:sp>
         <p:nvSpPr>
-          <p:cNvPr id="273" name="Google Shape;273;p39"/>
+          <p:cNvPr id="272" name="Google Shape;272;p39"/>
           <p:cNvSpPr txBox="1"/>
           <p:nvPr/>
         </p:nvSpPr>
@@ -21313,7 +21313,7 @@
       </p:sp>
       <p:pic>
         <p:nvPicPr>
-          <p:cNvPr id="274" name="Google Shape;274;p39"/>
+          <p:cNvPr id="273" name="Google Shape;273;p39"/>
           <p:cNvPicPr preferRelativeResize="0"/>
           <p:nvPr/>
         </p:nvPicPr>
@@ -21352,7 +21352,7 @@
   <p:cSld>
     <p:spTree>
       <p:nvGrpSpPr>
-        <p:cNvPr id="278" name="Shape 278"/>
+        <p:cNvPr id="277" name="Shape 277"/>
         <p:cNvGrpSpPr/>
         <p:nvPr/>
       </p:nvGrpSpPr>
@@ -21366,7 +21366,7 @@
       </p:grpSpPr>
       <p:sp>
         <p:nvSpPr>
-          <p:cNvPr id="279" name="Google Shape;279;p40"/>
+          <p:cNvPr id="278" name="Google Shape;278;p40"/>
           <p:cNvSpPr txBox="1"/>
           <p:nvPr>
             <p:ph type="title"/>
@@ -21417,7 +21417,7 @@
       </p:sp>
       <p:sp>
         <p:nvSpPr>
-          <p:cNvPr id="280" name="Google Shape;280;p40"/>
+          <p:cNvPr id="279" name="Google Shape;279;p40"/>
           <p:cNvSpPr txBox="1"/>
           <p:nvPr>
             <p:ph idx="12" type="sldNum"/>
@@ -21457,7 +21457,7 @@
       </p:sp>
       <p:sp>
         <p:nvSpPr>
-          <p:cNvPr id="281" name="Google Shape;281;p40"/>
+          <p:cNvPr id="280" name="Google Shape;280;p40"/>
           <p:cNvSpPr txBox="1"/>
           <p:nvPr/>
         </p:nvSpPr>
@@ -21663,7 +21663,7 @@
       </p:sp>
       <p:pic>
         <p:nvPicPr>
-          <p:cNvPr id="282" name="Google Shape;282;p40"/>
+          <p:cNvPr id="281" name="Google Shape;281;p40"/>
           <p:cNvPicPr preferRelativeResize="0"/>
           <p:nvPr/>
         </p:nvPicPr>
@@ -21702,7 +21702,7 @@
   <p:cSld>
     <p:spTree>
       <p:nvGrpSpPr>
-        <p:cNvPr id="286" name="Shape 286"/>
+        <p:cNvPr id="285" name="Shape 285"/>
         <p:cNvGrpSpPr/>
         <p:nvPr/>
       </p:nvGrpSpPr>
@@ -21716,7 +21716,7 @@
       </p:grpSpPr>
       <p:sp>
         <p:nvSpPr>
-          <p:cNvPr id="287" name="Google Shape;287;p41"/>
+          <p:cNvPr id="286" name="Google Shape;286;p41"/>
           <p:cNvSpPr txBox="1"/>
           <p:nvPr>
             <p:ph type="title"/>
@@ -21767,7 +21767,7 @@
       </p:sp>
       <p:sp>
         <p:nvSpPr>
-          <p:cNvPr id="288" name="Google Shape;288;p41"/>
+          <p:cNvPr id="287" name="Google Shape;287;p41"/>
           <p:cNvSpPr txBox="1"/>
           <p:nvPr>
             <p:ph idx="12" type="sldNum"/>
@@ -21807,7 +21807,7 @@
       </p:sp>
       <p:sp>
         <p:nvSpPr>
-          <p:cNvPr id="289" name="Google Shape;289;p41"/>
+          <p:cNvPr id="288" name="Google Shape;288;p41"/>
           <p:cNvSpPr txBox="1"/>
           <p:nvPr/>
         </p:nvSpPr>
@@ -21876,7 +21876,7 @@
       </p:sp>
       <p:pic>
         <p:nvPicPr>
-          <p:cNvPr id="290" name="Google Shape;290;p41"/>
+          <p:cNvPr id="289" name="Google Shape;289;p41"/>
           <p:cNvPicPr preferRelativeResize="0"/>
           <p:nvPr/>
         </p:nvPicPr>
@@ -22374,7 +22374,7 @@
   <p:cSld>
     <p:spTree>
       <p:nvGrpSpPr>
-        <p:cNvPr id="294" name="Shape 294"/>
+        <p:cNvPr id="293" name="Shape 293"/>
         <p:cNvGrpSpPr/>
         <p:nvPr/>
       </p:nvGrpSpPr>
@@ -22388,7 +22388,7 @@
       </p:grpSpPr>
       <p:sp>
         <p:nvSpPr>
-          <p:cNvPr id="295" name="Google Shape;295;p42"/>
+          <p:cNvPr id="294" name="Google Shape;294;p42"/>
           <p:cNvSpPr txBox="1"/>
           <p:nvPr>
             <p:ph type="title"/>
@@ -22439,7 +22439,7 @@
       </p:sp>
       <p:sp>
         <p:nvSpPr>
-          <p:cNvPr id="296" name="Google Shape;296;p42"/>
+          <p:cNvPr id="295" name="Google Shape;295;p42"/>
           <p:cNvSpPr txBox="1"/>
           <p:nvPr>
             <p:ph idx="12" type="sldNum"/>
@@ -22479,7 +22479,7 @@
       </p:sp>
       <p:sp>
         <p:nvSpPr>
-          <p:cNvPr id="297" name="Google Shape;297;p42"/>
+          <p:cNvPr id="296" name="Google Shape;296;p42"/>
           <p:cNvSpPr txBox="1"/>
           <p:nvPr/>
         </p:nvSpPr>
@@ -22586,7 +22586,7 @@
       </p:sp>
       <p:graphicFrame>
         <p:nvGraphicFramePr>
-          <p:cNvPr id="298" name="Google Shape;298;p42"/>
+          <p:cNvPr id="297" name="Google Shape;297;p42"/>
           <p:cNvGraphicFramePr/>
           <p:nvPr/>
         </p:nvGraphicFramePr>
@@ -22599,7 +22599,7 @@
             <a:tbl>
               <a:tblPr>
                 <a:noFill/>
-                <a:tableStyleId>{EB5EDB20-0582-42D3-A986-4CF8D7EC857A}</a:tableStyleId>
+                <a:tableStyleId>{D3737B69-F30C-4F95-9426-545B7725F03C}</a:tableStyleId>
               </a:tblPr>
               <a:tblGrid>
                 <a:gridCol w="5028300"/>
@@ -24128,7 +24128,7 @@
       </p:graphicFrame>
       <p:sp>
         <p:nvSpPr>
-          <p:cNvPr id="299" name="Google Shape;299;p42"/>
+          <p:cNvPr id="298" name="Google Shape;298;p42"/>
           <p:cNvSpPr txBox="1"/>
           <p:nvPr/>
         </p:nvSpPr>
@@ -24203,7 +24203,7 @@
       </p:sp>
       <p:sp>
         <p:nvSpPr>
-          <p:cNvPr id="300" name="Google Shape;300;p42"/>
+          <p:cNvPr id="299" name="Google Shape;299;p42"/>
           <p:cNvSpPr/>
           <p:nvPr/>
         </p:nvSpPr>
@@ -24266,7 +24266,7 @@
   <p:cSld>
     <p:spTree>
       <p:nvGrpSpPr>
-        <p:cNvPr id="304" name="Shape 304"/>
+        <p:cNvPr id="303" name="Shape 303"/>
         <p:cNvGrpSpPr/>
         <p:nvPr/>
       </p:nvGrpSpPr>
@@ -24280,7 +24280,7 @@
       </p:grpSpPr>
       <p:sp>
         <p:nvSpPr>
-          <p:cNvPr id="305" name="Google Shape;305;p43"/>
+          <p:cNvPr id="304" name="Google Shape;304;p43"/>
           <p:cNvSpPr txBox="1"/>
           <p:nvPr>
             <p:ph type="title"/>
@@ -24331,7 +24331,7 @@
       </p:sp>
       <p:sp>
         <p:nvSpPr>
-          <p:cNvPr id="306" name="Google Shape;306;p43"/>
+          <p:cNvPr id="305" name="Google Shape;305;p43"/>
           <p:cNvSpPr txBox="1"/>
           <p:nvPr>
             <p:ph idx="12" type="sldNum"/>
@@ -24371,7 +24371,7 @@
       </p:sp>
       <p:sp>
         <p:nvSpPr>
-          <p:cNvPr id="307" name="Google Shape;307;p43"/>
+          <p:cNvPr id="306" name="Google Shape;306;p43"/>
           <p:cNvSpPr txBox="1"/>
           <p:nvPr/>
         </p:nvSpPr>
@@ -24462,7 +24462,7 @@
       </p:sp>
       <p:pic>
         <p:nvPicPr>
-          <p:cNvPr id="308" name="Google Shape;308;p43"/>
+          <p:cNvPr id="307" name="Google Shape;307;p43"/>
           <p:cNvPicPr preferRelativeResize="0"/>
           <p:nvPr/>
         </p:nvPicPr>
@@ -24490,7 +24490,7 @@
       </p:pic>
       <p:sp>
         <p:nvSpPr>
-          <p:cNvPr id="309" name="Google Shape;309;p43"/>
+          <p:cNvPr id="308" name="Google Shape;308;p43"/>
           <p:cNvSpPr txBox="1"/>
           <p:nvPr/>
         </p:nvSpPr>
@@ -24609,7 +24609,7 @@
   <p:cSld>
     <p:spTree>
       <p:nvGrpSpPr>
-        <p:cNvPr id="313" name="Shape 313"/>
+        <p:cNvPr id="312" name="Shape 312"/>
         <p:cNvGrpSpPr/>
         <p:nvPr/>
       </p:nvGrpSpPr>
@@ -24623,7 +24623,7 @@
       </p:grpSpPr>
       <p:sp>
         <p:nvSpPr>
-          <p:cNvPr id="314" name="Google Shape;314;p44"/>
+          <p:cNvPr id="313" name="Google Shape;313;p44"/>
           <p:cNvSpPr txBox="1"/>
           <p:nvPr>
             <p:ph type="title"/>
@@ -24674,7 +24674,7 @@
       </p:sp>
       <p:sp>
         <p:nvSpPr>
-          <p:cNvPr id="315" name="Google Shape;315;p44"/>
+          <p:cNvPr id="314" name="Google Shape;314;p44"/>
           <p:cNvSpPr txBox="1"/>
           <p:nvPr>
             <p:ph idx="12" type="sldNum"/>
@@ -24714,7 +24714,7 @@
       </p:sp>
       <p:sp>
         <p:nvSpPr>
-          <p:cNvPr id="316" name="Google Shape;316;p44"/>
+          <p:cNvPr id="315" name="Google Shape;315;p44"/>
           <p:cNvSpPr txBox="1"/>
           <p:nvPr/>
         </p:nvSpPr>
@@ -24789,7 +24789,7 @@
       </p:sp>
       <p:graphicFrame>
         <p:nvGraphicFramePr>
-          <p:cNvPr id="317" name="Google Shape;317;p44"/>
+          <p:cNvPr id="316" name="Google Shape;316;p44"/>
           <p:cNvGraphicFramePr/>
           <p:nvPr/>
         </p:nvGraphicFramePr>
@@ -24802,7 +24802,7 @@
             <a:tbl>
               <a:tblPr>
                 <a:noFill/>
-                <a:tableStyleId>{EB5EDB20-0582-42D3-A986-4CF8D7EC857A}</a:tableStyleId>
+                <a:tableStyleId>{D3737B69-F30C-4F95-9426-545B7725F03C}</a:tableStyleId>
               </a:tblPr>
               <a:tblGrid>
                 <a:gridCol w="6009225"/>
@@ -26450,7 +26450,7 @@
       </p:graphicFrame>
       <p:sp>
         <p:nvSpPr>
-          <p:cNvPr id="318" name="Google Shape;318;p44"/>
+          <p:cNvPr id="317" name="Google Shape;317;p44"/>
           <p:cNvSpPr/>
           <p:nvPr/>
         </p:nvSpPr>
@@ -26502,7 +26502,7 @@
       </p:sp>
       <p:sp>
         <p:nvSpPr>
-          <p:cNvPr id="319" name="Google Shape;319;p44"/>
+          <p:cNvPr id="318" name="Google Shape;318;p44"/>
           <p:cNvSpPr/>
           <p:nvPr/>
         </p:nvSpPr>
@@ -26554,7 +26554,7 @@
       </p:sp>
       <p:sp>
         <p:nvSpPr>
-          <p:cNvPr id="320" name="Google Shape;320;p44"/>
+          <p:cNvPr id="319" name="Google Shape;319;p44"/>
           <p:cNvSpPr/>
           <p:nvPr/>
         </p:nvSpPr>
@@ -26606,7 +26606,7 @@
       </p:sp>
       <p:sp>
         <p:nvSpPr>
-          <p:cNvPr id="321" name="Google Shape;321;p44"/>
+          <p:cNvPr id="320" name="Google Shape;320;p44"/>
           <p:cNvSpPr txBox="1"/>
           <p:nvPr/>
         </p:nvSpPr>
@@ -26673,7 +26673,7 @@
       </p:sp>
       <p:sp>
         <p:nvSpPr>
-          <p:cNvPr id="322" name="Google Shape;322;p44"/>
+          <p:cNvPr id="321" name="Google Shape;321;p44"/>
           <p:cNvSpPr txBox="1"/>
           <p:nvPr/>
         </p:nvSpPr>
@@ -26732,7 +26732,7 @@
       </p:sp>
       <p:sp>
         <p:nvSpPr>
-          <p:cNvPr id="323" name="Google Shape;323;p44"/>
+          <p:cNvPr id="322" name="Google Shape;322;p44"/>
           <p:cNvSpPr/>
           <p:nvPr/>
         </p:nvSpPr>
@@ -26784,7 +26784,7 @@
       </p:sp>
       <p:sp>
         <p:nvSpPr>
-          <p:cNvPr id="324" name="Google Shape;324;p44"/>
+          <p:cNvPr id="323" name="Google Shape;323;p44"/>
           <p:cNvSpPr txBox="1"/>
           <p:nvPr/>
         </p:nvSpPr>
@@ -26854,7 +26854,7 @@
   <p:cSld>
     <p:spTree>
       <p:nvGrpSpPr>
-        <p:cNvPr id="328" name="Shape 328"/>
+        <p:cNvPr id="327" name="Shape 327"/>
         <p:cNvGrpSpPr/>
         <p:nvPr/>
       </p:nvGrpSpPr>
@@ -26868,7 +26868,7 @@
       </p:grpSpPr>
       <p:sp>
         <p:nvSpPr>
-          <p:cNvPr id="329" name="Google Shape;329;p45"/>
+          <p:cNvPr id="328" name="Google Shape;328;p45"/>
           <p:cNvSpPr txBox="1"/>
           <p:nvPr>
             <p:ph idx="1" type="subTitle"/>
@@ -26924,7 +26924,7 @@
       </p:sp>
       <p:pic>
         <p:nvPicPr>
-          <p:cNvPr id="330" name="Google Shape;330;p45"/>
+          <p:cNvPr id="329" name="Google Shape;329;p45"/>
           <p:cNvPicPr preferRelativeResize="0"/>
           <p:nvPr/>
         </p:nvPicPr>
@@ -26952,7 +26952,7 @@
       </p:pic>
       <p:sp>
         <p:nvSpPr>
-          <p:cNvPr id="331" name="Google Shape;331;p45"/>
+          <p:cNvPr id="330" name="Google Shape;330;p45"/>
           <p:cNvSpPr txBox="1"/>
           <p:nvPr/>
         </p:nvSpPr>
@@ -27092,6 +27092,64 @@
             <a:endParaRPr b="1" sz="1200">
               <a:solidFill>
                 <a:schemeClr val="dk1"/>
+              </a:solidFill>
+            </a:endParaRPr>
+          </a:p>
+          <a:p>
+            <a:pPr indent="0" lvl="0" marL="0" rtl="0" algn="ctr">
+              <a:lnSpc>
+                <a:spcPct val="115000"/>
+              </a:lnSpc>
+              <a:spcBef>
+                <a:spcPts val="0"/>
+              </a:spcBef>
+              <a:spcAft>
+                <a:spcPts val="0"/>
+              </a:spcAft>
+              <a:buNone/>
+            </a:pPr>
+            <a:r>
+              <a:t/>
+            </a:r>
+            <a:endParaRPr b="1" sz="1200">
+              <a:solidFill>
+                <a:schemeClr val="dk1"/>
+              </a:solidFill>
+            </a:endParaRPr>
+          </a:p>
+          <a:p>
+            <a:pPr indent="0" lvl="0" marL="0" rtl="0" algn="ctr">
+              <a:lnSpc>
+                <a:spcPct val="115000"/>
+              </a:lnSpc>
+              <a:spcBef>
+                <a:spcPts val="0"/>
+              </a:spcBef>
+              <a:spcAft>
+                <a:spcPts val="0"/>
+              </a:spcAft>
+              <a:buNone/>
+            </a:pPr>
+            <a:r>
+              <a:rPr b="1" lang="en" sz="1600" u="sng">
+                <a:solidFill>
+                  <a:srgbClr val="CC0000"/>
+                </a:solidFill>
+                <a:hlinkClick r:id="rId5"/>
+              </a:rPr>
+              <a:t>https://bit.ly/2Khi6eo</a:t>
+            </a:r>
+            <a:r>
+              <a:rPr b="1" lang="en" sz="1600">
+                <a:solidFill>
+                  <a:srgbClr val="CC0000"/>
+                </a:solidFill>
+              </a:rPr>
+              <a:t> </a:t>
+            </a:r>
+            <a:endParaRPr b="1" sz="1600">
+              <a:solidFill>
+                <a:srgbClr val="CC0000"/>
               </a:solidFill>
             </a:endParaRPr>
           </a:p>
@@ -28150,7 +28208,7 @@
             <a:tbl>
               <a:tblPr>
                 <a:noFill/>
-                <a:tableStyleId>{EB5EDB20-0582-42D3-A986-4CF8D7EC857A}</a:tableStyleId>
+                <a:tableStyleId>{D3737B69-F30C-4F95-9426-545B7725F03C}</a:tableStyleId>
               </a:tblPr>
               <a:tblGrid>
                 <a:gridCol w="8438350"/>
@@ -30382,7 +30440,7 @@
         </p:nvSpPr>
         <p:spPr>
           <a:xfrm>
-            <a:off x="8472458" y="4663217"/>
+            <a:off x="8407658" y="4063817"/>
             <a:ext cx="548700" cy="393600"/>
           </a:xfrm>
           <a:prstGeom prst="rect">
@@ -30412,190 +30470,9 @@
           </a:p>
         </p:txBody>
       </p:sp>
-      <p:sp>
-        <p:nvSpPr>
-          <p:cNvPr id="123" name="Google Shape;123;p21"/>
-          <p:cNvSpPr txBox="1"/>
-          <p:nvPr/>
-        </p:nvSpPr>
-        <p:spPr>
-          <a:xfrm>
-            <a:off x="311700" y="1188675"/>
-            <a:ext cx="8520600" cy="1262100"/>
-          </a:xfrm>
-          <a:prstGeom prst="rect">
-            <a:avLst/>
-          </a:prstGeom>
-          <a:noFill/>
-          <a:ln>
-            <a:noFill/>
-          </a:ln>
-        </p:spPr>
-        <p:txBody>
-          <a:bodyPr anchorCtr="0" anchor="t" bIns="91425" lIns="91425" spcFirstLastPara="1" rIns="91425" wrap="square" tIns="91425">
-            <a:noAutofit/>
-          </a:bodyPr>
-          <a:lstStyle/>
-          <a:p>
-            <a:pPr indent="0" lvl="0" marL="0" rtl="0" algn="l">
-              <a:lnSpc>
-                <a:spcPct val="115000"/>
-              </a:lnSpc>
-              <a:spcBef>
-                <a:spcPts val="0"/>
-              </a:spcBef>
-              <a:spcAft>
-                <a:spcPts val="0"/>
-              </a:spcAft>
-              <a:buNone/>
-            </a:pPr>
-            <a:r>
-              <a:rPr lang="en" sz="1200">
-                <a:solidFill>
-                  <a:schemeClr val="dk1"/>
-                </a:solidFill>
-              </a:rPr>
-              <a:t>The transition block consists of a:</a:t>
-            </a:r>
-            <a:endParaRPr sz="1200">
-              <a:solidFill>
-                <a:schemeClr val="dk1"/>
-              </a:solidFill>
-            </a:endParaRPr>
-          </a:p>
-          <a:p>
-            <a:pPr indent="0" lvl="0" marL="0" rtl="0" algn="l">
-              <a:lnSpc>
-                <a:spcPct val="115000"/>
-              </a:lnSpc>
-              <a:spcBef>
-                <a:spcPts val="0"/>
-              </a:spcBef>
-              <a:spcAft>
-                <a:spcPts val="0"/>
-              </a:spcAft>
-              <a:buNone/>
-            </a:pPr>
-            <a:r>
-              <a:t/>
-            </a:r>
-            <a:endParaRPr b="1" sz="1200">
-              <a:solidFill>
-                <a:srgbClr val="4A86E8"/>
-              </a:solidFill>
-            </a:endParaRPr>
-          </a:p>
-          <a:p>
-            <a:pPr indent="-304800" lvl="0" marL="457200" rtl="0" algn="l">
-              <a:lnSpc>
-                <a:spcPct val="115000"/>
-              </a:lnSpc>
-              <a:spcBef>
-                <a:spcPts val="0"/>
-              </a:spcBef>
-              <a:spcAft>
-                <a:spcPts val="0"/>
-              </a:spcAft>
-              <a:buClr>
-                <a:srgbClr val="4A86E8"/>
-              </a:buClr>
-              <a:buSzPts val="1200"/>
-              <a:buChar char="●"/>
-            </a:pPr>
-            <a:r>
-              <a:rPr b="1" lang="en" sz="1200">
-                <a:solidFill>
-                  <a:srgbClr val="4A86E8"/>
-                </a:solidFill>
-              </a:rPr>
-              <a:t>A 1x1 bottleneck convolution which reduces the number of output feature maps (channels) by a compression factor C.</a:t>
-            </a:r>
-            <a:endParaRPr b="1" sz="1200">
-              <a:solidFill>
-                <a:srgbClr val="4A86E8"/>
-              </a:solidFill>
-            </a:endParaRPr>
-          </a:p>
-          <a:p>
-            <a:pPr indent="-304800" lvl="0" marL="457200" rtl="0" algn="l">
-              <a:lnSpc>
-                <a:spcPct val="115000"/>
-              </a:lnSpc>
-              <a:spcBef>
-                <a:spcPts val="0"/>
-              </a:spcBef>
-              <a:spcAft>
-                <a:spcPts val="0"/>
-              </a:spcAft>
-              <a:buClr>
-                <a:srgbClr val="4A86E8"/>
-              </a:buClr>
-              <a:buSzPts val="1200"/>
-              <a:buChar char="●"/>
-            </a:pPr>
-            <a:r>
-              <a:rPr b="1" lang="en" sz="1200">
-                <a:solidFill>
-                  <a:srgbClr val="4A86E8"/>
-                </a:solidFill>
-              </a:rPr>
-              <a:t>Followed by a strided average pooling that then reduces the size of each feature map by 75%.</a:t>
-            </a:r>
-            <a:endParaRPr b="1" sz="1200">
-              <a:solidFill>
-                <a:srgbClr val="4A86E8"/>
-              </a:solidFill>
-            </a:endParaRPr>
-          </a:p>
-          <a:p>
-            <a:pPr indent="0" lvl="0" marL="0" rtl="0" algn="l">
-              <a:lnSpc>
-                <a:spcPct val="115000"/>
-              </a:lnSpc>
-              <a:spcBef>
-                <a:spcPts val="0"/>
-              </a:spcBef>
-              <a:spcAft>
-                <a:spcPts val="0"/>
-              </a:spcAft>
-              <a:buNone/>
-            </a:pPr>
-            <a:r>
-              <a:t/>
-            </a:r>
-            <a:endParaRPr sz="1200">
-              <a:solidFill>
-                <a:schemeClr val="dk1"/>
-              </a:solidFill>
-            </a:endParaRPr>
-          </a:p>
-          <a:p>
-            <a:pPr indent="0" lvl="0" marL="0" rtl="0" algn="l">
-              <a:lnSpc>
-                <a:spcPct val="115000"/>
-              </a:lnSpc>
-              <a:spcBef>
-                <a:spcPts val="0"/>
-              </a:spcBef>
-              <a:spcAft>
-                <a:spcPts val="0"/>
-              </a:spcAft>
-              <a:buNone/>
-            </a:pPr>
-            <a:r>
-              <a:t/>
-            </a:r>
-            <a:endParaRPr sz="1100">
-              <a:solidFill>
-                <a:schemeClr val="dk1"/>
-              </a:solidFill>
-            </a:endParaRPr>
-          </a:p>
-        </p:txBody>
-      </p:sp>
       <p:pic>
         <p:nvPicPr>
-          <p:cNvPr id="124" name="Google Shape;124;p21"/>
+          <p:cNvPr id="123" name="Google Shape;123;p21"/>
           <p:cNvPicPr preferRelativeResize="0"/>
           <p:nvPr/>
         </p:nvPicPr>
@@ -30609,7 +30486,7 @@
         </p:blipFill>
         <p:spPr>
           <a:xfrm>
-            <a:off x="420325" y="2343875"/>
+            <a:off x="258325" y="1744475"/>
             <a:ext cx="3686734" cy="2765050"/>
           </a:xfrm>
           <a:prstGeom prst="rect">
@@ -30623,12 +30500,12 @@
       </p:pic>
       <p:graphicFrame>
         <p:nvGraphicFramePr>
-          <p:cNvPr id="125" name="Google Shape;125;p21"/>
+          <p:cNvPr id="124" name="Google Shape;124;p21"/>
           <p:cNvGraphicFramePr/>
           <p:nvPr/>
         </p:nvGraphicFramePr>
         <p:xfrm>
-          <a:off x="4107050" y="2450763"/>
+          <a:off x="4042250" y="1851363"/>
           <a:ext cx="3000000" cy="3000000"/>
         </p:xfrm>
         <a:graphic>
@@ -30636,7 +30513,7 @@
             <a:tbl>
               <a:tblPr>
                 <a:noFill/>
-                <a:tableStyleId>{EB5EDB20-0582-42D3-A986-4CF8D7EC857A}</a:tableStyleId>
+                <a:tableStyleId>{D3737B69-F30C-4F95-9426-545B7725F03C}</a:tableStyleId>
               </a:tblPr>
               <a:tblGrid>
                 <a:gridCol w="4725250"/>
@@ -30948,6 +30825,9 @@
                         <a:t># Bottleneck convolution </a:t>
                       </a:r>
                       <a:endParaRPr sz="1000">
+                        <a:solidFill>
+                          <a:srgbClr val="455A64"/>
+                        </a:solidFill>
                         <a:latin typeface="Consolas"/>
                         <a:ea typeface="Consolas"/>
                         <a:cs typeface="Consolas"/>
@@ -30969,6 +30849,9 @@
                       </a:pPr>
                       <a:r>
                         <a:rPr lang="en" sz="1000">
+                          <a:solidFill>
+                            <a:schemeClr val="dk1"/>
+                          </a:solidFill>
                           <a:latin typeface="Consolas"/>
                           <a:ea typeface="Consolas"/>
                           <a:cs typeface="Consolas"/>
@@ -30990,16 +30873,31 @@
                       </a:r>
                       <a:r>
                         <a:rPr lang="en" sz="1000">
-                          <a:latin typeface="Consolas"/>
-                          <a:ea typeface="Consolas"/>
-                          <a:cs typeface="Consolas"/>
-                          <a:sym typeface="Consolas"/>
-                        </a:rPr>
-                        <a:t> layers</a:t>
+                          <a:solidFill>
+                            <a:schemeClr val="dk1"/>
+                          </a:solidFill>
+                          <a:latin typeface="Consolas"/>
+                          <a:ea typeface="Consolas"/>
+                          <a:cs typeface="Consolas"/>
+                          <a:sym typeface="Consolas"/>
+                        </a:rPr>
+                        <a:t> </a:t>
                       </a:r>
                       <a:r>
                         <a:rPr lang="en" sz="1000">
                           <a:solidFill>
+                            <a:srgbClr val="3367D6"/>
+                          </a:solidFill>
+                          <a:latin typeface="Consolas"/>
+                          <a:ea typeface="Consolas"/>
+                          <a:cs typeface="Consolas"/>
+                          <a:sym typeface="Consolas"/>
+                        </a:rPr>
+                        <a:t>BatchNormalization</a:t>
+                      </a:r>
+                      <a:r>
+                        <a:rPr lang="en" sz="1000">
+                          <a:solidFill>
                             <a:srgbClr val="616161"/>
                           </a:solidFill>
                           <a:latin typeface="Consolas"/>
@@ -31007,7 +30905,120 @@
                           <a:cs typeface="Consolas"/>
                           <a:sym typeface="Consolas"/>
                         </a:rPr>
-                        <a:t>.</a:t>
+                        <a:t>()(</a:t>
+                      </a:r>
+                      <a:r>
+                        <a:rPr lang="en" sz="1000">
+                          <a:solidFill>
+                            <a:schemeClr val="dk1"/>
+                          </a:solidFill>
+                          <a:latin typeface="Consolas"/>
+                          <a:ea typeface="Consolas"/>
+                          <a:cs typeface="Consolas"/>
+                          <a:sym typeface="Consolas"/>
+                        </a:rPr>
+                        <a:t>x</a:t>
+                      </a:r>
+                      <a:r>
+                        <a:rPr lang="en" sz="1000">
+                          <a:solidFill>
+                            <a:srgbClr val="616161"/>
+                          </a:solidFill>
+                          <a:latin typeface="Consolas"/>
+                          <a:ea typeface="Consolas"/>
+                          <a:cs typeface="Consolas"/>
+                          <a:sym typeface="Consolas"/>
+                        </a:rPr>
+                        <a:t>)</a:t>
+                      </a:r>
+                      <a:endParaRPr sz="1000">
+                        <a:solidFill>
+                          <a:srgbClr val="616161"/>
+                        </a:solidFill>
+                        <a:latin typeface="Consolas"/>
+                        <a:ea typeface="Consolas"/>
+                        <a:cs typeface="Consolas"/>
+                        <a:sym typeface="Consolas"/>
+                      </a:endParaRPr>
+                    </a:p>
+                    <a:p>
+                      <a:pPr indent="0" lvl="0" marL="0" rtl="0" algn="l">
+                        <a:lnSpc>
+                          <a:spcPct val="115000"/>
+                        </a:lnSpc>
+                        <a:spcBef>
+                          <a:spcPts val="0"/>
+                        </a:spcBef>
+                        <a:spcAft>
+                          <a:spcPts val="0"/>
+                        </a:spcAft>
+                        <a:buClr>
+                          <a:schemeClr val="dk1"/>
+                        </a:buClr>
+                        <a:buSzPts val="1100"/>
+                        <a:buFont typeface="Arial"/>
+                        <a:buNone/>
+                      </a:pPr>
+                      <a:r>
+                        <a:rPr lang="en" sz="850">
+                          <a:solidFill>
+                            <a:schemeClr val="dk1"/>
+                          </a:solidFill>
+                        </a:rPr>
+                        <a:t>#   BN-LI-Conv pre-activation form of convolutions</a:t>
+                      </a:r>
+                      <a:endParaRPr sz="1000">
+                        <a:solidFill>
+                          <a:srgbClr val="616161"/>
+                        </a:solidFill>
+                        <a:latin typeface="Consolas"/>
+                        <a:ea typeface="Consolas"/>
+                        <a:cs typeface="Consolas"/>
+                        <a:sym typeface="Consolas"/>
+                      </a:endParaRPr>
+                    </a:p>
+                    <a:p>
+                      <a:pPr indent="0" lvl="0" marL="0" rtl="0" algn="l">
+                        <a:lnSpc>
+                          <a:spcPct val="115000"/>
+                        </a:lnSpc>
+                        <a:spcBef>
+                          <a:spcPts val="0"/>
+                        </a:spcBef>
+                        <a:spcAft>
+                          <a:spcPts val="0"/>
+                        </a:spcAft>
+                        <a:buNone/>
+                      </a:pPr>
+                      <a:r>
+                        <a:rPr lang="en" sz="1000">
+                          <a:latin typeface="Consolas"/>
+                          <a:ea typeface="Consolas"/>
+                          <a:cs typeface="Consolas"/>
+                          <a:sym typeface="Consolas"/>
+                        </a:rPr>
+                        <a:t>x </a:t>
+                      </a:r>
+                      <a:r>
+                        <a:rPr lang="en" sz="1000">
+                          <a:solidFill>
+                            <a:srgbClr val="616161"/>
+                          </a:solidFill>
+                          <a:latin typeface="Consolas"/>
+                          <a:ea typeface="Consolas"/>
+                          <a:cs typeface="Consolas"/>
+                          <a:sym typeface="Consolas"/>
+                        </a:rPr>
+                        <a:t>=</a:t>
+                      </a:r>
+                      <a:r>
+                        <a:rPr lang="en" sz="1000">
+                          <a:latin typeface="Consolas"/>
+                          <a:ea typeface="Consolas"/>
+                          <a:cs typeface="Consolas"/>
+                          <a:sym typeface="Consolas"/>
+                        </a:rPr>
+                        <a:t> </a:t>
                       </a:r>
                       <a:r>
                         <a:rPr lang="en" sz="1000">
@@ -31267,85 +31278,7 @@
                           <a:cs typeface="Consolas"/>
                           <a:sym typeface="Consolas"/>
                         </a:rPr>
-                        <a:t>x </a:t>
-                      </a:r>
-                      <a:r>
-                        <a:rPr lang="en" sz="1000">
-                          <a:solidFill>
-                            <a:srgbClr val="616161"/>
-                          </a:solidFill>
-                          <a:latin typeface="Consolas"/>
-                          <a:ea typeface="Consolas"/>
-                          <a:cs typeface="Consolas"/>
-                          <a:sym typeface="Consolas"/>
-                        </a:rPr>
-                        <a:t>=</a:t>
-                      </a:r>
-                      <a:r>
-                        <a:rPr lang="en" sz="1000">
-                          <a:latin typeface="Consolas"/>
-                          <a:ea typeface="Consolas"/>
-                          <a:cs typeface="Consolas"/>
-                          <a:sym typeface="Consolas"/>
-                        </a:rPr>
-                        <a:t> layers</a:t>
-                      </a:r>
-                      <a:r>
-                        <a:rPr lang="en" sz="1000">
-                          <a:solidFill>
-                            <a:srgbClr val="616161"/>
-                          </a:solidFill>
-                          <a:latin typeface="Consolas"/>
-                          <a:ea typeface="Consolas"/>
-                          <a:cs typeface="Consolas"/>
-                          <a:sym typeface="Consolas"/>
-                        </a:rPr>
-                        <a:t>.</a:t>
-                      </a:r>
-                      <a:r>
-                        <a:rPr lang="en" sz="1000">
-                          <a:solidFill>
-                            <a:srgbClr val="3367D6"/>
-                          </a:solidFill>
-                          <a:latin typeface="Consolas"/>
-                          <a:ea typeface="Consolas"/>
-                          <a:cs typeface="Consolas"/>
-                          <a:sym typeface="Consolas"/>
-                        </a:rPr>
-                        <a:t>BatchNormalization</a:t>
-                      </a:r>
-                      <a:r>
-                        <a:rPr lang="en" sz="1000">
-                          <a:solidFill>
-                            <a:srgbClr val="616161"/>
-                          </a:solidFill>
-                          <a:latin typeface="Consolas"/>
-                          <a:ea typeface="Consolas"/>
-                          <a:cs typeface="Consolas"/>
-                          <a:sym typeface="Consolas"/>
-                        </a:rPr>
-                        <a:t>()(</a:t>
-                      </a:r>
-                      <a:r>
-                        <a:rPr lang="en" sz="1000">
-                          <a:latin typeface="Consolas"/>
-                          <a:ea typeface="Consolas"/>
-                          <a:cs typeface="Consolas"/>
-                          <a:sym typeface="Consolas"/>
-                        </a:rPr>
-                        <a:t>x</a:t>
-                      </a:r>
-                      <a:r>
-                        <a:rPr lang="en" sz="1000">
-                          <a:solidFill>
-                            <a:srgbClr val="616161"/>
-                          </a:solidFill>
-                          <a:latin typeface="Consolas"/>
-                          <a:ea typeface="Consolas"/>
-                          <a:cs typeface="Consolas"/>
-                          <a:sym typeface="Consolas"/>
-                        </a:rPr>
-                        <a:t>)</a:t>
+                        <a:t>    </a:t>
                       </a:r>
                       <a:endParaRPr sz="1000">
                         <a:latin typeface="Consolas"/>
@@ -31369,99 +31302,59 @@
                       </a:pPr>
                       <a:r>
                         <a:rPr lang="en" sz="1000">
-                          <a:latin typeface="Consolas"/>
-                          <a:ea typeface="Consolas"/>
-                          <a:cs typeface="Consolas"/>
-                          <a:sym typeface="Consolas"/>
-                        </a:rPr>
-                        <a:t>x </a:t>
-                      </a:r>
-                      <a:r>
+                          <a:solidFill>
+                            <a:srgbClr val="455A64"/>
+                          </a:solidFill>
+                          <a:latin typeface="Consolas"/>
+                          <a:ea typeface="Consolas"/>
+                          <a:cs typeface="Consolas"/>
+                          <a:sym typeface="Consolas"/>
+                        </a:rPr>
+                        <a:t># Use mean value (average) instead of max value sampling when </a:t>
+                      </a:r>
+                      <a:br>
                         <a:rPr lang="en" sz="1000">
                           <a:solidFill>
-                            <a:srgbClr val="616161"/>
-                          </a:solidFill>
-                          <a:latin typeface="Consolas"/>
-                          <a:ea typeface="Consolas"/>
-                          <a:cs typeface="Consolas"/>
-                          <a:sym typeface="Consolas"/>
-                        </a:rPr>
-                        <a:t>=</a:t>
-                      </a:r>
+                            <a:srgbClr val="455A64"/>
+                          </a:solidFill>
+                          <a:latin typeface="Consolas"/>
+                          <a:ea typeface="Consolas"/>
+                          <a:cs typeface="Consolas"/>
+                          <a:sym typeface="Consolas"/>
+                        </a:rPr>
+                      </a:br>
                       <a:r>
                         <a:rPr lang="en" sz="1000">
-                          <a:latin typeface="Consolas"/>
-                          <a:ea typeface="Consolas"/>
-                          <a:cs typeface="Consolas"/>
-                          <a:sym typeface="Consolas"/>
-                        </a:rPr>
-                        <a:t> layers</a:t>
+                          <a:solidFill>
+                            <a:srgbClr val="455A64"/>
+                          </a:solidFill>
+                          <a:latin typeface="Consolas"/>
+                          <a:ea typeface="Consolas"/>
+                          <a:cs typeface="Consolas"/>
+                          <a:sym typeface="Consolas"/>
+                        </a:rPr>
+                        <a:t># pooling</a:t>
                       </a:r>
                       <a:r>
                         <a:rPr lang="en" sz="1000">
-                          <a:solidFill>
-                            <a:srgbClr val="616161"/>
-                          </a:solidFill>
-                          <a:latin typeface="Consolas"/>
-                          <a:ea typeface="Consolas"/>
-                          <a:cs typeface="Consolas"/>
-                          <a:sym typeface="Consolas"/>
-                        </a:rPr>
-                        <a:t>.</a:t>
+                          <a:latin typeface="Consolas"/>
+                          <a:ea typeface="Consolas"/>
+                          <a:cs typeface="Consolas"/>
+                          <a:sym typeface="Consolas"/>
+                        </a:rPr>
+                        <a:t> - </a:t>
                       </a:r>
                       <a:r>
                         <a:rPr lang="en" sz="1000">
                           <a:solidFill>
-                            <a:srgbClr val="3367D6"/>
-                          </a:solidFill>
-                          <a:latin typeface="Consolas"/>
-                          <a:ea typeface="Consolas"/>
-                          <a:cs typeface="Consolas"/>
-                          <a:sym typeface="Consolas"/>
-                        </a:rPr>
-                        <a:t>ReLU</a:t>
-                      </a:r>
-                      <a:r>
-                        <a:rPr lang="en" sz="1000">
-                          <a:solidFill>
-                            <a:srgbClr val="616161"/>
-                          </a:solidFill>
-                          <a:latin typeface="Consolas"/>
-                          <a:ea typeface="Consolas"/>
-                          <a:cs typeface="Consolas"/>
-                          <a:sym typeface="Consolas"/>
-                        </a:rPr>
-                        <a:t>()(</a:t>
-                      </a:r>
-                      <a:r>
-                        <a:rPr lang="en" sz="1000">
-                          <a:latin typeface="Consolas"/>
-                          <a:ea typeface="Consolas"/>
-                          <a:cs typeface="Consolas"/>
-                          <a:sym typeface="Consolas"/>
-                        </a:rPr>
-                        <a:t>x</a:t>
-                      </a:r>
-                      <a:r>
-                        <a:rPr lang="en" sz="1000">
-                          <a:solidFill>
-                            <a:srgbClr val="616161"/>
-                          </a:solidFill>
-                          <a:latin typeface="Consolas"/>
-                          <a:ea typeface="Consolas"/>
-                          <a:cs typeface="Consolas"/>
-                          <a:sym typeface="Consolas"/>
-                        </a:rPr>
-                        <a:t>)</a:t>
-                      </a:r>
-                      <a:r>
-                        <a:rPr lang="en" sz="1000">
-                          <a:latin typeface="Consolas"/>
-                          <a:ea typeface="Consolas"/>
-                          <a:cs typeface="Consolas"/>
-                          <a:sym typeface="Consolas"/>
-                        </a:rPr>
-                        <a:t>  </a:t>
+                            <a:srgbClr val="455A64"/>
+                          </a:solidFill>
+                          <a:latin typeface="Consolas"/>
+                          <a:ea typeface="Consolas"/>
+                          <a:cs typeface="Consolas"/>
+                          <a:sym typeface="Consolas"/>
+                        </a:rPr>
+                        <a:t>reduce by 75%</a:t>
                       </a:r>
                       <a:endParaRPr sz="1000">
                         <a:latin typeface="Consolas"/>
@@ -31490,145 +31383,28 @@
                           <a:cs typeface="Consolas"/>
                           <a:sym typeface="Consolas"/>
                         </a:rPr>
-                        <a:t>    </a:t>
-                      </a:r>
-                      <a:endParaRPr sz="1000">
-                        <a:latin typeface="Consolas"/>
-                        <a:ea typeface="Consolas"/>
-                        <a:cs typeface="Consolas"/>
-                        <a:sym typeface="Consolas"/>
-                      </a:endParaRPr>
-                    </a:p>
-                    <a:p>
-                      <a:pPr indent="0" lvl="0" marL="0" rtl="0" algn="l">
-                        <a:lnSpc>
-                          <a:spcPct val="115000"/>
-                        </a:lnSpc>
-                        <a:spcBef>
-                          <a:spcPts val="0"/>
-                        </a:spcBef>
-                        <a:spcAft>
-                          <a:spcPts val="0"/>
-                        </a:spcAft>
-                        <a:buNone/>
-                      </a:pPr>
+                        <a:t>x </a:t>
+                      </a:r>
                       <a:r>
                         <a:rPr lang="en" sz="1000">
                           <a:solidFill>
-                            <a:srgbClr val="455A64"/>
-                          </a:solidFill>
-                          <a:latin typeface="Consolas"/>
-                          <a:ea typeface="Consolas"/>
-                          <a:cs typeface="Consolas"/>
-                          <a:sym typeface="Consolas"/>
-                        </a:rPr>
-                        <a:t># Use mean value (average) instead of max value sampling when </a:t>
-                      </a:r>
-                      <a:br>
+                            <a:srgbClr val="616161"/>
+                          </a:solidFill>
+                          <a:latin typeface="Consolas"/>
+                          <a:ea typeface="Consolas"/>
+                          <a:cs typeface="Consolas"/>
+                          <a:sym typeface="Consolas"/>
+                        </a:rPr>
+                        <a:t>=</a:t>
+                      </a:r>
+                      <a:r>
                         <a:rPr lang="en" sz="1000">
-                          <a:solidFill>
-                            <a:srgbClr val="455A64"/>
-                          </a:solidFill>
-                          <a:latin typeface="Consolas"/>
-                          <a:ea typeface="Consolas"/>
-                          <a:cs typeface="Consolas"/>
-                          <a:sym typeface="Consolas"/>
-                        </a:rPr>
-                      </a:br>
-                      <a:r>
-                        <a:rPr lang="en" sz="1000">
-                          <a:solidFill>
-                            <a:srgbClr val="455A64"/>
-                          </a:solidFill>
-                          <a:latin typeface="Consolas"/>
-                          <a:ea typeface="Consolas"/>
-                          <a:cs typeface="Consolas"/>
-                          <a:sym typeface="Consolas"/>
-                        </a:rPr>
-                        <a:t># pooling</a:t>
-                      </a:r>
-                      <a:r>
-                        <a:rPr lang="en" sz="1000">
-                          <a:latin typeface="Consolas"/>
-                          <a:ea typeface="Consolas"/>
-                          <a:cs typeface="Consolas"/>
-                          <a:sym typeface="Consolas"/>
-                        </a:rPr>
-                        <a:t> - </a:t>
-                      </a:r>
-                      <a:r>
-                        <a:rPr lang="en" sz="1000">
-                          <a:solidFill>
-                            <a:srgbClr val="455A64"/>
-                          </a:solidFill>
-                          <a:latin typeface="Consolas"/>
-                          <a:ea typeface="Consolas"/>
-                          <a:cs typeface="Consolas"/>
-                          <a:sym typeface="Consolas"/>
-                        </a:rPr>
-                        <a:t>reduce by 75%</a:t>
-                      </a:r>
-                      <a:endParaRPr sz="1000">
-                        <a:latin typeface="Consolas"/>
-                        <a:ea typeface="Consolas"/>
-                        <a:cs typeface="Consolas"/>
-                        <a:sym typeface="Consolas"/>
-                      </a:endParaRPr>
-                    </a:p>
-                    <a:p>
-                      <a:pPr indent="0" lvl="0" marL="0" rtl="0" algn="l">
-                        <a:lnSpc>
-                          <a:spcPct val="115000"/>
-                        </a:lnSpc>
-                        <a:spcBef>
-                          <a:spcPts val="0"/>
-                        </a:spcBef>
-                        <a:spcAft>
-                          <a:spcPts val="0"/>
-                        </a:spcAft>
-                        <a:buNone/>
-                      </a:pPr>
-                      <a:r>
-                        <a:rPr lang="en" sz="1000">
-                          <a:latin typeface="Consolas"/>
-                          <a:ea typeface="Consolas"/>
-                          <a:cs typeface="Consolas"/>
-                          <a:sym typeface="Consolas"/>
-                        </a:rPr>
-                        <a:t>x </a:t>
-                      </a:r>
-                      <a:r>
-                        <a:rPr lang="en" sz="1000">
-                          <a:solidFill>
-                            <a:srgbClr val="616161"/>
-                          </a:solidFill>
-                          <a:latin typeface="Consolas"/>
-                          <a:ea typeface="Consolas"/>
-                          <a:cs typeface="Consolas"/>
-                          <a:sym typeface="Consolas"/>
-                        </a:rPr>
-                        <a:t>=</a:t>
-                      </a:r>
-                      <a:r>
-                        <a:rPr lang="en" sz="1000">
-                          <a:latin typeface="Consolas"/>
-                          <a:ea typeface="Consolas"/>
-                          <a:cs typeface="Consolas"/>
-                          <a:sym typeface="Consolas"/>
-                        </a:rPr>
-                        <a:t> layers</a:t>
-                      </a:r>
-                      <a:r>
-                        <a:rPr lang="en" sz="1000">
-                          <a:solidFill>
-                            <a:srgbClr val="616161"/>
-                          </a:solidFill>
-                          <a:latin typeface="Consolas"/>
-                          <a:ea typeface="Consolas"/>
-                          <a:cs typeface="Consolas"/>
-                          <a:sym typeface="Consolas"/>
-                        </a:rPr>
-                        <a:t>.</a:t>
+                          <a:latin typeface="Consolas"/>
+                          <a:ea typeface="Consolas"/>
+                          <a:cs typeface="Consolas"/>
+                          <a:sym typeface="Consolas"/>
+                        </a:rPr>
+                        <a:t> </a:t>
                       </a:r>
                       <a:r>
                         <a:rPr lang="en" sz="1000">

</xml_diff>